<commit_message>
updated with bubble practice
</commit_message>
<xml_diff>
--- a/slides/On-Campus/14_02_SearchingAndSorting.pptx
+++ b/slides/On-Campus/14_02_SearchingAndSorting.pptx
@@ -5,10 +5,10 @@
     <p:sldMasterId id="2147483648" r:id="rId1"/>
   </p:sldMasterIdLst>
   <p:notesMasterIdLst>
-    <p:notesMasterId r:id="rId12"/>
+    <p:notesMasterId r:id="rId13"/>
   </p:notesMasterIdLst>
   <p:handoutMasterIdLst>
-    <p:handoutMasterId r:id="rId13"/>
+    <p:handoutMasterId r:id="rId14"/>
   </p:handoutMasterIdLst>
   <p:sldIdLst>
     <p:sldId id="256" r:id="rId2"/>
@@ -16,11 +16,12 @@
     <p:sldId id="257" r:id="rId4"/>
     <p:sldId id="258" r:id="rId5"/>
     <p:sldId id="259" r:id="rId6"/>
-    <p:sldId id="260" r:id="rId7"/>
-    <p:sldId id="261" r:id="rId8"/>
-    <p:sldId id="263" r:id="rId9"/>
-    <p:sldId id="272" r:id="rId10"/>
-    <p:sldId id="273" r:id="rId11"/>
+    <p:sldId id="274" r:id="rId7"/>
+    <p:sldId id="260" r:id="rId8"/>
+    <p:sldId id="261" r:id="rId9"/>
+    <p:sldId id="263" r:id="rId10"/>
+    <p:sldId id="272" r:id="rId11"/>
+    <p:sldId id="273" r:id="rId12"/>
   </p:sldIdLst>
   <p:sldSz cx="13817600" cy="7772400"/>
   <p:notesSz cx="6858000" cy="9144000"/>
@@ -480,7 +481,7 @@
           <a:p>
             <a:fld id="{4D7E51A5-B478-1E40-8CBB-0DAA8831E99D}" type="datetimeFigureOut">
               <a:rPr lang="en-US" smtClean="0"/>
-              <a:t>11/30/2021</a:t>
+              <a:t>11/30/21</a:t>
             </a:fld>
             <a:endParaRPr lang="en-US"/>
           </a:p>
@@ -645,7 +646,7 @@
           <a:p>
             <a:fld id="{D0ED587F-861E-6740-9643-E3DDAE89B8D6}" type="datetimeFigureOut">
               <a:rPr lang="en-US" smtClean="0"/>
-              <a:t>11/29/2021</a:t>
+              <a:t>11/30/21</a:t>
             </a:fld>
             <a:endParaRPr lang="en-US"/>
           </a:p>
@@ -7607,6 +7608,1611 @@
             <p:ph type="title"/>
           </p:nvPr>
         </p:nvSpPr>
+        <p:spPr/>
+        <p:txBody>
+          <a:bodyPr/>
+          <a:lstStyle/>
+          <a:p>
+            <a:r>
+              <a:rPr lang="en-US" dirty="0"/>
+              <a:t>Country</a:t>
+            </a:r>
+          </a:p>
+        </p:txBody>
+      </p:sp>
+      <p:sp>
+        <p:nvSpPr>
+          <p:cNvPr id="6" name="Rectangle 1">
+            <a:extLst>
+              <a:ext uri="{FF2B5EF4-FFF2-40B4-BE49-F238E27FC236}">
+                <a16:creationId xmlns:a16="http://schemas.microsoft.com/office/drawing/2014/main" id="{8ED0C47D-BC17-44BF-B794-1EBF50A776A9}"/>
+              </a:ext>
+            </a:extLst>
+          </p:cNvPr>
+          <p:cNvSpPr>
+            <a:spLocks noChangeArrowheads="1"/>
+          </p:cNvSpPr>
+          <p:nvPr/>
+        </p:nvSpPr>
+        <p:spPr bwMode="auto">
+          <a:xfrm>
+            <a:off x="3880884" y="422081"/>
+            <a:ext cx="7464056" cy="6740307"/>
+          </a:xfrm>
+          <a:prstGeom prst="rect">
+            <a:avLst/>
+          </a:prstGeom>
+          <a:solidFill>
+            <a:srgbClr val="2B2B2B"/>
+          </a:solidFill>
+          <a:ln>
+            <a:noFill/>
+          </a:ln>
+          <a:effectLst/>
+          <a:extLst>
+            <a:ext uri="{91240B29-F687-4F45-9708-019B960494DF}">
+              <a14:hiddenLine xmlns:a14="http://schemas.microsoft.com/office/drawing/2010/main" w="9525">
+                <a:solidFill>
+                  <a:schemeClr val="tx1"/>
+                </a:solidFill>
+                <a:miter lim="800000"/>
+                <a:headEnd/>
+                <a:tailEnd/>
+              </a14:hiddenLine>
+            </a:ext>
+            <a:ext uri="{AF507438-7753-43E0-B8FC-AC1667EBCBE1}">
+              <a14:hiddenEffects xmlns:a14="http://schemas.microsoft.com/office/drawing/2010/main">
+                <a:effectLst>
+                  <a:outerShdw dist="35921" dir="2700000" algn="ctr" rotWithShape="0">
+                    <a:schemeClr val="bg2"/>
+                  </a:outerShdw>
+                </a:effectLst>
+              </a14:hiddenEffects>
+            </a:ext>
+          </a:extLst>
+        </p:spPr>
+        <p:txBody>
+          <a:bodyPr vert="horz" wrap="square" lIns="91440" tIns="45720" rIns="91440" bIns="45720" numCol="1" anchor="ctr" anchorCtr="0" compatLnSpc="1">
+            <a:prstTxWarp prst="textNoShape">
+              <a:avLst/>
+            </a:prstTxWarp>
+            <a:spAutoFit/>
+          </a:bodyPr>
+          <a:lstStyle/>
+          <a:p>
+            <a:pPr marL="0" marR="0" lvl="0" indent="0" algn="l" defTabSz="914400" rtl="0" eaLnBrk="0" fontAlgn="base" latinLnBrk="0" hangingPunct="0">
+              <a:lnSpc>
+                <a:spcPct val="100000"/>
+              </a:lnSpc>
+              <a:spcBef>
+                <a:spcPct val="0"/>
+              </a:spcBef>
+              <a:spcAft>
+                <a:spcPct val="0"/>
+              </a:spcAft>
+              <a:buClrTx/>
+              <a:buSzTx/>
+              <a:buFontTx/>
+              <a:buNone/>
+              <a:tabLst/>
+            </a:pPr>
+            <a:r>
+              <a:rPr kumimoji="0" lang="en-US" altLang="en-US" sz="1800" b="0" i="0" u="none" strike="noStrike" cap="none" normalizeH="0" baseline="0">
+                <a:ln>
+                  <a:noFill/>
+                </a:ln>
+                <a:solidFill>
+                  <a:srgbClr val="CC7832"/>
+                </a:solidFill>
+                <a:effectLst/>
+                <a:latin typeface="JetBrains Mono"/>
+              </a:rPr>
+              <a:t>public class </a:t>
+            </a:r>
+            <a:r>
+              <a:rPr kumimoji="0" lang="en-US" altLang="en-US" sz="1800" b="0" i="0" u="none" strike="noStrike" cap="none" normalizeH="0" baseline="0">
+                <a:ln>
+                  <a:noFill/>
+                </a:ln>
+                <a:solidFill>
+                  <a:srgbClr val="A9B7C6"/>
+                </a:solidFill>
+                <a:effectLst/>
+                <a:latin typeface="JetBrains Mono"/>
+              </a:rPr>
+              <a:t>Country </a:t>
+            </a:r>
+            <a:r>
+              <a:rPr kumimoji="0" lang="en-US" altLang="en-US" sz="1800" b="0" i="0" u="none" strike="noStrike" cap="none" normalizeH="0" baseline="0">
+                <a:ln>
+                  <a:noFill/>
+                </a:ln>
+                <a:solidFill>
+                  <a:srgbClr val="CC7832"/>
+                </a:solidFill>
+                <a:effectLst/>
+                <a:latin typeface="JetBrains Mono"/>
+              </a:rPr>
+              <a:t>implements </a:t>
+            </a:r>
+            <a:r>
+              <a:rPr kumimoji="0" lang="en-US" altLang="en-US" sz="1800" b="0" i="0" u="none" strike="noStrike" cap="none" normalizeH="0" baseline="0">
+                <a:ln>
+                  <a:noFill/>
+                </a:ln>
+                <a:solidFill>
+                  <a:srgbClr val="A9B7C6"/>
+                </a:solidFill>
+                <a:effectLst/>
+                <a:latin typeface="JetBrains Mono"/>
+              </a:rPr>
+              <a:t>Comparable&lt;Country&gt;{</a:t>
+            </a:r>
+            <a:br>
+              <a:rPr kumimoji="0" lang="en-US" altLang="en-US" sz="1800" b="0" i="0" u="none" strike="noStrike" cap="none" normalizeH="0" baseline="0">
+                <a:ln>
+                  <a:noFill/>
+                </a:ln>
+                <a:solidFill>
+                  <a:srgbClr val="A9B7C6"/>
+                </a:solidFill>
+                <a:effectLst/>
+                <a:latin typeface="JetBrains Mono"/>
+              </a:rPr>
+            </a:br>
+            <a:r>
+              <a:rPr kumimoji="0" lang="en-US" altLang="en-US" sz="1800" b="0" i="0" u="none" strike="noStrike" cap="none" normalizeH="0" baseline="0">
+                <a:ln>
+                  <a:noFill/>
+                </a:ln>
+                <a:solidFill>
+                  <a:srgbClr val="A9B7C6"/>
+                </a:solidFill>
+                <a:effectLst/>
+                <a:latin typeface="JetBrains Mono"/>
+              </a:rPr>
+              <a:t>    </a:t>
+            </a:r>
+            <a:r>
+              <a:rPr kumimoji="0" lang="en-US" altLang="en-US" sz="1800" b="0" i="0" u="none" strike="noStrike" cap="none" normalizeH="0" baseline="0">
+                <a:ln>
+                  <a:noFill/>
+                </a:ln>
+                <a:solidFill>
+                  <a:srgbClr val="CC7832"/>
+                </a:solidFill>
+                <a:effectLst/>
+                <a:latin typeface="JetBrains Mono"/>
+              </a:rPr>
+              <a:t>private </a:t>
+            </a:r>
+            <a:r>
+              <a:rPr kumimoji="0" lang="en-US" altLang="en-US" sz="1800" b="0" i="0" u="none" strike="noStrike" cap="none" normalizeH="0" baseline="0">
+                <a:ln>
+                  <a:noFill/>
+                </a:ln>
+                <a:solidFill>
+                  <a:srgbClr val="A9B7C6"/>
+                </a:solidFill>
+                <a:effectLst/>
+                <a:latin typeface="JetBrains Mono"/>
+              </a:rPr>
+              <a:t>String </a:t>
+            </a:r>
+            <a:r>
+              <a:rPr kumimoji="0" lang="en-US" altLang="en-US" sz="1800" b="0" i="0" u="none" strike="noStrike" cap="none" normalizeH="0" baseline="0">
+                <a:ln>
+                  <a:noFill/>
+                </a:ln>
+                <a:solidFill>
+                  <a:srgbClr val="9876AA"/>
+                </a:solidFill>
+                <a:effectLst/>
+                <a:latin typeface="JetBrains Mono"/>
+              </a:rPr>
+              <a:t>name</a:t>
+            </a:r>
+            <a:r>
+              <a:rPr kumimoji="0" lang="en-US" altLang="en-US" sz="1800" b="0" i="0" u="none" strike="noStrike" cap="none" normalizeH="0" baseline="0">
+                <a:ln>
+                  <a:noFill/>
+                </a:ln>
+                <a:solidFill>
+                  <a:srgbClr val="CC7832"/>
+                </a:solidFill>
+                <a:effectLst/>
+                <a:latin typeface="JetBrains Mono"/>
+              </a:rPr>
+              <a:t>;</a:t>
+            </a:r>
+            <a:br>
+              <a:rPr kumimoji="0" lang="en-US" altLang="en-US" sz="1800" b="0" i="0" u="none" strike="noStrike" cap="none" normalizeH="0" baseline="0">
+                <a:ln>
+                  <a:noFill/>
+                </a:ln>
+                <a:solidFill>
+                  <a:srgbClr val="CC7832"/>
+                </a:solidFill>
+                <a:effectLst/>
+                <a:latin typeface="JetBrains Mono"/>
+              </a:rPr>
+            </a:br>
+            <a:r>
+              <a:rPr kumimoji="0" lang="en-US" altLang="en-US" sz="1800" b="0" i="0" u="none" strike="noStrike" cap="none" normalizeH="0" baseline="0">
+                <a:ln>
+                  <a:noFill/>
+                </a:ln>
+                <a:solidFill>
+                  <a:srgbClr val="CC7832"/>
+                </a:solidFill>
+                <a:effectLst/>
+                <a:latin typeface="JetBrains Mono"/>
+              </a:rPr>
+              <a:t>    private double </a:t>
+            </a:r>
+            <a:r>
+              <a:rPr kumimoji="0" lang="en-US" altLang="en-US" sz="1800" b="0" i="0" u="none" strike="noStrike" cap="none" normalizeH="0" baseline="0">
+                <a:ln>
+                  <a:noFill/>
+                </a:ln>
+                <a:solidFill>
+                  <a:srgbClr val="9876AA"/>
+                </a:solidFill>
+                <a:effectLst/>
+                <a:latin typeface="JetBrains Mono"/>
+              </a:rPr>
+              <a:t>area</a:t>
+            </a:r>
+            <a:r>
+              <a:rPr kumimoji="0" lang="en-US" altLang="en-US" sz="1800" b="0" i="0" u="none" strike="noStrike" cap="none" normalizeH="0" baseline="0">
+                <a:ln>
+                  <a:noFill/>
+                </a:ln>
+                <a:solidFill>
+                  <a:srgbClr val="CC7832"/>
+                </a:solidFill>
+                <a:effectLst/>
+                <a:latin typeface="JetBrains Mono"/>
+              </a:rPr>
+              <a:t>;</a:t>
+            </a:r>
+            <a:br>
+              <a:rPr kumimoji="0" lang="en-US" altLang="en-US" sz="1800" b="0" i="0" u="none" strike="noStrike" cap="none" normalizeH="0" baseline="0">
+                <a:ln>
+                  <a:noFill/>
+                </a:ln>
+                <a:solidFill>
+                  <a:srgbClr val="CC7832"/>
+                </a:solidFill>
+                <a:effectLst/>
+                <a:latin typeface="JetBrains Mono"/>
+              </a:rPr>
+            </a:br>
+            <a:r>
+              <a:rPr kumimoji="0" lang="en-US" altLang="en-US" sz="1800" b="0" i="0" u="none" strike="noStrike" cap="none" normalizeH="0" baseline="0">
+                <a:ln>
+                  <a:noFill/>
+                </a:ln>
+                <a:solidFill>
+                  <a:srgbClr val="CC7832"/>
+                </a:solidFill>
+                <a:effectLst/>
+                <a:latin typeface="JetBrains Mono"/>
+              </a:rPr>
+              <a:t>    static boolean </a:t>
+            </a:r>
+            <a:r>
+              <a:rPr kumimoji="0" lang="en-US" altLang="en-US" sz="1800" b="0" i="1" u="none" strike="noStrike" cap="none" normalizeH="0" baseline="0">
+                <a:ln>
+                  <a:noFill/>
+                </a:ln>
+                <a:solidFill>
+                  <a:srgbClr val="9876AA"/>
+                </a:solidFill>
+                <a:effectLst/>
+                <a:latin typeface="JetBrains Mono"/>
+              </a:rPr>
+              <a:t>compareData</a:t>
+            </a:r>
+            <a:r>
+              <a:rPr kumimoji="0" lang="en-US" altLang="en-US" sz="1800" b="0" i="0" u="none" strike="noStrike" cap="none" normalizeH="0" baseline="0">
+                <a:ln>
+                  <a:noFill/>
+                </a:ln>
+                <a:solidFill>
+                  <a:srgbClr val="CC7832"/>
+                </a:solidFill>
+                <a:effectLst/>
+                <a:latin typeface="JetBrains Mono"/>
+              </a:rPr>
+              <a:t>;</a:t>
+            </a:r>
+            <a:br>
+              <a:rPr kumimoji="0" lang="en-US" altLang="en-US" sz="1800" b="0" i="0" u="none" strike="noStrike" cap="none" normalizeH="0" baseline="0">
+                <a:ln>
+                  <a:noFill/>
+                </a:ln>
+                <a:solidFill>
+                  <a:srgbClr val="CC7832"/>
+                </a:solidFill>
+                <a:effectLst/>
+                <a:latin typeface="JetBrains Mono"/>
+              </a:rPr>
+            </a:br>
+            <a:r>
+              <a:rPr kumimoji="0" lang="en-US" altLang="en-US" sz="1800" b="0" i="0" u="none" strike="noStrike" cap="none" normalizeH="0" baseline="0">
+                <a:ln>
+                  <a:noFill/>
+                </a:ln>
+                <a:solidFill>
+                  <a:srgbClr val="CC7832"/>
+                </a:solidFill>
+                <a:effectLst/>
+                <a:latin typeface="JetBrains Mono"/>
+              </a:rPr>
+              <a:t>    public </a:t>
+            </a:r>
+            <a:r>
+              <a:rPr kumimoji="0" lang="en-US" altLang="en-US" sz="1800" b="0" i="0" u="none" strike="noStrike" cap="none" normalizeH="0" baseline="0">
+                <a:ln>
+                  <a:noFill/>
+                </a:ln>
+                <a:solidFill>
+                  <a:srgbClr val="FFC66D"/>
+                </a:solidFill>
+                <a:effectLst/>
+                <a:latin typeface="JetBrains Mono"/>
+              </a:rPr>
+              <a:t>Country</a:t>
+            </a:r>
+            <a:r>
+              <a:rPr kumimoji="0" lang="en-US" altLang="en-US" sz="1800" b="0" i="0" u="none" strike="noStrike" cap="none" normalizeH="0" baseline="0">
+                <a:ln>
+                  <a:noFill/>
+                </a:ln>
+                <a:solidFill>
+                  <a:srgbClr val="A9B7C6"/>
+                </a:solidFill>
+                <a:effectLst/>
+                <a:latin typeface="JetBrains Mono"/>
+              </a:rPr>
+              <a:t>(String name</a:t>
+            </a:r>
+            <a:r>
+              <a:rPr kumimoji="0" lang="en-US" altLang="en-US" sz="1800" b="0" i="0" u="none" strike="noStrike" cap="none" normalizeH="0" baseline="0">
+                <a:ln>
+                  <a:noFill/>
+                </a:ln>
+                <a:solidFill>
+                  <a:srgbClr val="CC7832"/>
+                </a:solidFill>
+                <a:effectLst/>
+                <a:latin typeface="JetBrains Mono"/>
+              </a:rPr>
+              <a:t>, double </a:t>
+            </a:r>
+            <a:r>
+              <a:rPr kumimoji="0" lang="en-US" altLang="en-US" sz="1800" b="0" i="0" u="none" strike="noStrike" cap="none" normalizeH="0" baseline="0">
+                <a:ln>
+                  <a:noFill/>
+                </a:ln>
+                <a:solidFill>
+                  <a:srgbClr val="A9B7C6"/>
+                </a:solidFill>
+                <a:effectLst/>
+                <a:latin typeface="JetBrains Mono"/>
+              </a:rPr>
+              <a:t>area){</a:t>
+            </a:r>
+            <a:br>
+              <a:rPr kumimoji="0" lang="en-US" altLang="en-US" sz="1800" b="0" i="0" u="none" strike="noStrike" cap="none" normalizeH="0" baseline="0">
+                <a:ln>
+                  <a:noFill/>
+                </a:ln>
+                <a:solidFill>
+                  <a:srgbClr val="A9B7C6"/>
+                </a:solidFill>
+                <a:effectLst/>
+                <a:latin typeface="JetBrains Mono"/>
+              </a:rPr>
+            </a:br>
+            <a:r>
+              <a:rPr kumimoji="0" lang="en-US" altLang="en-US" sz="1800" b="0" i="0" u="none" strike="noStrike" cap="none" normalizeH="0" baseline="0">
+                <a:ln>
+                  <a:noFill/>
+                </a:ln>
+                <a:solidFill>
+                  <a:srgbClr val="A9B7C6"/>
+                </a:solidFill>
+                <a:effectLst/>
+                <a:latin typeface="JetBrains Mono"/>
+              </a:rPr>
+              <a:t>        </a:t>
+            </a:r>
+            <a:r>
+              <a:rPr kumimoji="0" lang="en-US" altLang="en-US" sz="1800" b="0" i="0" u="none" strike="noStrike" cap="none" normalizeH="0" baseline="0">
+                <a:ln>
+                  <a:noFill/>
+                </a:ln>
+                <a:solidFill>
+                  <a:srgbClr val="CC7832"/>
+                </a:solidFill>
+                <a:effectLst/>
+                <a:latin typeface="JetBrains Mono"/>
+              </a:rPr>
+              <a:t>this</a:t>
+            </a:r>
+            <a:r>
+              <a:rPr kumimoji="0" lang="en-US" altLang="en-US" sz="1800" b="0" i="0" u="none" strike="noStrike" cap="none" normalizeH="0" baseline="0">
+                <a:ln>
+                  <a:noFill/>
+                </a:ln>
+                <a:solidFill>
+                  <a:srgbClr val="A9B7C6"/>
+                </a:solidFill>
+                <a:effectLst/>
+                <a:latin typeface="JetBrains Mono"/>
+              </a:rPr>
+              <a:t>.</a:t>
+            </a:r>
+            <a:r>
+              <a:rPr kumimoji="0" lang="en-US" altLang="en-US" sz="1800" b="0" i="0" u="none" strike="noStrike" cap="none" normalizeH="0" baseline="0">
+                <a:ln>
+                  <a:noFill/>
+                </a:ln>
+                <a:solidFill>
+                  <a:srgbClr val="9876AA"/>
+                </a:solidFill>
+                <a:effectLst/>
+                <a:latin typeface="JetBrains Mono"/>
+              </a:rPr>
+              <a:t>name </a:t>
+            </a:r>
+            <a:r>
+              <a:rPr kumimoji="0" lang="en-US" altLang="en-US" sz="1800" b="0" i="0" u="none" strike="noStrike" cap="none" normalizeH="0" baseline="0">
+                <a:ln>
+                  <a:noFill/>
+                </a:ln>
+                <a:solidFill>
+                  <a:srgbClr val="A9B7C6"/>
+                </a:solidFill>
+                <a:effectLst/>
+                <a:latin typeface="JetBrains Mono"/>
+              </a:rPr>
+              <a:t>= name</a:t>
+            </a:r>
+            <a:r>
+              <a:rPr kumimoji="0" lang="en-US" altLang="en-US" sz="1800" b="0" i="0" u="none" strike="noStrike" cap="none" normalizeH="0" baseline="0">
+                <a:ln>
+                  <a:noFill/>
+                </a:ln>
+                <a:solidFill>
+                  <a:srgbClr val="CC7832"/>
+                </a:solidFill>
+                <a:effectLst/>
+                <a:latin typeface="JetBrains Mono"/>
+              </a:rPr>
+              <a:t>;</a:t>
+            </a:r>
+            <a:br>
+              <a:rPr kumimoji="0" lang="en-US" altLang="en-US" sz="1800" b="0" i="0" u="none" strike="noStrike" cap="none" normalizeH="0" baseline="0">
+                <a:ln>
+                  <a:noFill/>
+                </a:ln>
+                <a:solidFill>
+                  <a:srgbClr val="CC7832"/>
+                </a:solidFill>
+                <a:effectLst/>
+                <a:latin typeface="JetBrains Mono"/>
+              </a:rPr>
+            </a:br>
+            <a:r>
+              <a:rPr kumimoji="0" lang="en-US" altLang="en-US" sz="1800" b="0" i="0" u="none" strike="noStrike" cap="none" normalizeH="0" baseline="0">
+                <a:ln>
+                  <a:noFill/>
+                </a:ln>
+                <a:solidFill>
+                  <a:srgbClr val="CC7832"/>
+                </a:solidFill>
+                <a:effectLst/>
+                <a:latin typeface="JetBrains Mono"/>
+              </a:rPr>
+              <a:t>        this</a:t>
+            </a:r>
+            <a:r>
+              <a:rPr kumimoji="0" lang="en-US" altLang="en-US" sz="1800" b="0" i="0" u="none" strike="noStrike" cap="none" normalizeH="0" baseline="0">
+                <a:ln>
+                  <a:noFill/>
+                </a:ln>
+                <a:solidFill>
+                  <a:srgbClr val="A9B7C6"/>
+                </a:solidFill>
+                <a:effectLst/>
+                <a:latin typeface="JetBrains Mono"/>
+              </a:rPr>
+              <a:t>.</a:t>
+            </a:r>
+            <a:r>
+              <a:rPr kumimoji="0" lang="en-US" altLang="en-US" sz="1800" b="0" i="0" u="none" strike="noStrike" cap="none" normalizeH="0" baseline="0">
+                <a:ln>
+                  <a:noFill/>
+                </a:ln>
+                <a:solidFill>
+                  <a:srgbClr val="9876AA"/>
+                </a:solidFill>
+                <a:effectLst/>
+                <a:latin typeface="JetBrains Mono"/>
+              </a:rPr>
+              <a:t>area </a:t>
+            </a:r>
+            <a:r>
+              <a:rPr kumimoji="0" lang="en-US" altLang="en-US" sz="1800" b="0" i="0" u="none" strike="noStrike" cap="none" normalizeH="0" baseline="0">
+                <a:ln>
+                  <a:noFill/>
+                </a:ln>
+                <a:solidFill>
+                  <a:srgbClr val="A9B7C6"/>
+                </a:solidFill>
+                <a:effectLst/>
+                <a:latin typeface="JetBrains Mono"/>
+              </a:rPr>
+              <a:t>= area</a:t>
+            </a:r>
+            <a:r>
+              <a:rPr kumimoji="0" lang="en-US" altLang="en-US" sz="1800" b="0" i="0" u="none" strike="noStrike" cap="none" normalizeH="0" baseline="0">
+                <a:ln>
+                  <a:noFill/>
+                </a:ln>
+                <a:solidFill>
+                  <a:srgbClr val="CC7832"/>
+                </a:solidFill>
+                <a:effectLst/>
+                <a:latin typeface="JetBrains Mono"/>
+              </a:rPr>
+              <a:t>;</a:t>
+            </a:r>
+            <a:br>
+              <a:rPr kumimoji="0" lang="en-US" altLang="en-US" sz="1800" b="0" i="0" u="none" strike="noStrike" cap="none" normalizeH="0" baseline="0">
+                <a:ln>
+                  <a:noFill/>
+                </a:ln>
+                <a:solidFill>
+                  <a:srgbClr val="CC7832"/>
+                </a:solidFill>
+                <a:effectLst/>
+                <a:latin typeface="JetBrains Mono"/>
+              </a:rPr>
+            </a:br>
+            <a:r>
+              <a:rPr kumimoji="0" lang="en-US" altLang="en-US" sz="1800" b="0" i="0" u="none" strike="noStrike" cap="none" normalizeH="0" baseline="0">
+                <a:ln>
+                  <a:noFill/>
+                </a:ln>
+                <a:solidFill>
+                  <a:srgbClr val="CC7832"/>
+                </a:solidFill>
+                <a:effectLst/>
+                <a:latin typeface="JetBrains Mono"/>
+              </a:rPr>
+              <a:t>    </a:t>
+            </a:r>
+            <a:r>
+              <a:rPr kumimoji="0" lang="en-US" altLang="en-US" sz="1800" b="0" i="0" u="none" strike="noStrike" cap="none" normalizeH="0" baseline="0">
+                <a:ln>
+                  <a:noFill/>
+                </a:ln>
+                <a:solidFill>
+                  <a:srgbClr val="A9B7C6"/>
+                </a:solidFill>
+                <a:effectLst/>
+                <a:latin typeface="JetBrains Mono"/>
+              </a:rPr>
+              <a:t>}</a:t>
+            </a:r>
+            <a:br>
+              <a:rPr kumimoji="0" lang="en-US" altLang="en-US" sz="1800" b="0" i="0" u="none" strike="noStrike" cap="none" normalizeH="0" baseline="0">
+                <a:ln>
+                  <a:noFill/>
+                </a:ln>
+                <a:solidFill>
+                  <a:srgbClr val="A9B7C6"/>
+                </a:solidFill>
+                <a:effectLst/>
+                <a:latin typeface="JetBrains Mono"/>
+              </a:rPr>
+            </a:br>
+            <a:r>
+              <a:rPr kumimoji="0" lang="en-US" altLang="en-US" sz="1800" b="0" i="0" u="none" strike="noStrike" cap="none" normalizeH="0" baseline="0">
+                <a:ln>
+                  <a:noFill/>
+                </a:ln>
+                <a:solidFill>
+                  <a:srgbClr val="A9B7C6"/>
+                </a:solidFill>
+                <a:effectLst/>
+                <a:latin typeface="JetBrains Mono"/>
+              </a:rPr>
+              <a:t>    </a:t>
+            </a:r>
+            <a:r>
+              <a:rPr kumimoji="0" lang="en-US" altLang="en-US" sz="1800" b="0" i="0" u="none" strike="noStrike" cap="none" normalizeH="0" baseline="0">
+                <a:ln>
+                  <a:noFill/>
+                </a:ln>
+                <a:solidFill>
+                  <a:srgbClr val="CC7832"/>
+                </a:solidFill>
+                <a:effectLst/>
+                <a:latin typeface="JetBrains Mono"/>
+              </a:rPr>
+              <a:t>public double </a:t>
+            </a:r>
+            <a:r>
+              <a:rPr kumimoji="0" lang="en-US" altLang="en-US" sz="1800" b="0" i="0" u="none" strike="noStrike" cap="none" normalizeH="0" baseline="0">
+                <a:ln>
+                  <a:noFill/>
+                </a:ln>
+                <a:solidFill>
+                  <a:srgbClr val="FFC66D"/>
+                </a:solidFill>
+                <a:effectLst/>
+                <a:latin typeface="JetBrains Mono"/>
+              </a:rPr>
+              <a:t>getArea</a:t>
+            </a:r>
+            <a:r>
+              <a:rPr kumimoji="0" lang="en-US" altLang="en-US" sz="1800" b="0" i="0" u="none" strike="noStrike" cap="none" normalizeH="0" baseline="0">
+                <a:ln>
+                  <a:noFill/>
+                </a:ln>
+                <a:solidFill>
+                  <a:srgbClr val="A9B7C6"/>
+                </a:solidFill>
+                <a:effectLst/>
+                <a:latin typeface="JetBrains Mono"/>
+              </a:rPr>
+              <a:t>(){</a:t>
+            </a:r>
+            <a:br>
+              <a:rPr kumimoji="0" lang="en-US" altLang="en-US" sz="1800" b="0" i="0" u="none" strike="noStrike" cap="none" normalizeH="0" baseline="0">
+                <a:ln>
+                  <a:noFill/>
+                </a:ln>
+                <a:solidFill>
+                  <a:srgbClr val="A9B7C6"/>
+                </a:solidFill>
+                <a:effectLst/>
+                <a:latin typeface="JetBrains Mono"/>
+              </a:rPr>
+            </a:br>
+            <a:r>
+              <a:rPr kumimoji="0" lang="en-US" altLang="en-US" sz="1800" b="0" i="0" u="none" strike="noStrike" cap="none" normalizeH="0" baseline="0">
+                <a:ln>
+                  <a:noFill/>
+                </a:ln>
+                <a:solidFill>
+                  <a:srgbClr val="A9B7C6"/>
+                </a:solidFill>
+                <a:effectLst/>
+                <a:latin typeface="JetBrains Mono"/>
+              </a:rPr>
+              <a:t>        </a:t>
+            </a:r>
+            <a:r>
+              <a:rPr kumimoji="0" lang="en-US" altLang="en-US" sz="1800" b="0" i="0" u="none" strike="noStrike" cap="none" normalizeH="0" baseline="0">
+                <a:ln>
+                  <a:noFill/>
+                </a:ln>
+                <a:solidFill>
+                  <a:srgbClr val="CC7832"/>
+                </a:solidFill>
+                <a:effectLst/>
+                <a:latin typeface="JetBrains Mono"/>
+              </a:rPr>
+              <a:t>return </a:t>
+            </a:r>
+            <a:r>
+              <a:rPr kumimoji="0" lang="en-US" altLang="en-US" sz="1800" b="0" i="0" u="none" strike="noStrike" cap="none" normalizeH="0" baseline="0">
+                <a:ln>
+                  <a:noFill/>
+                </a:ln>
+                <a:solidFill>
+                  <a:srgbClr val="9876AA"/>
+                </a:solidFill>
+                <a:effectLst/>
+                <a:latin typeface="JetBrains Mono"/>
+              </a:rPr>
+              <a:t>area</a:t>
+            </a:r>
+            <a:r>
+              <a:rPr kumimoji="0" lang="en-US" altLang="en-US" sz="1800" b="0" i="0" u="none" strike="noStrike" cap="none" normalizeH="0" baseline="0">
+                <a:ln>
+                  <a:noFill/>
+                </a:ln>
+                <a:solidFill>
+                  <a:srgbClr val="CC7832"/>
+                </a:solidFill>
+                <a:effectLst/>
+                <a:latin typeface="JetBrains Mono"/>
+              </a:rPr>
+              <a:t>;</a:t>
+            </a:r>
+            <a:br>
+              <a:rPr kumimoji="0" lang="en-US" altLang="en-US" sz="1800" b="0" i="0" u="none" strike="noStrike" cap="none" normalizeH="0" baseline="0">
+                <a:ln>
+                  <a:noFill/>
+                </a:ln>
+                <a:solidFill>
+                  <a:srgbClr val="CC7832"/>
+                </a:solidFill>
+                <a:effectLst/>
+                <a:latin typeface="JetBrains Mono"/>
+              </a:rPr>
+            </a:br>
+            <a:r>
+              <a:rPr kumimoji="0" lang="en-US" altLang="en-US" sz="1800" b="0" i="0" u="none" strike="noStrike" cap="none" normalizeH="0" baseline="0">
+                <a:ln>
+                  <a:noFill/>
+                </a:ln>
+                <a:solidFill>
+                  <a:srgbClr val="CC7832"/>
+                </a:solidFill>
+                <a:effectLst/>
+                <a:latin typeface="JetBrains Mono"/>
+              </a:rPr>
+              <a:t>    </a:t>
+            </a:r>
+            <a:r>
+              <a:rPr kumimoji="0" lang="en-US" altLang="en-US" sz="1800" b="0" i="0" u="none" strike="noStrike" cap="none" normalizeH="0" baseline="0">
+                <a:ln>
+                  <a:noFill/>
+                </a:ln>
+                <a:solidFill>
+                  <a:srgbClr val="A9B7C6"/>
+                </a:solidFill>
+                <a:effectLst/>
+                <a:latin typeface="JetBrains Mono"/>
+              </a:rPr>
+              <a:t>}</a:t>
+            </a:r>
+            <a:br>
+              <a:rPr kumimoji="0" lang="en-US" altLang="en-US" sz="1800" b="0" i="0" u="none" strike="noStrike" cap="none" normalizeH="0" baseline="0">
+                <a:ln>
+                  <a:noFill/>
+                </a:ln>
+                <a:solidFill>
+                  <a:srgbClr val="A9B7C6"/>
+                </a:solidFill>
+                <a:effectLst/>
+                <a:latin typeface="JetBrains Mono"/>
+              </a:rPr>
+            </a:br>
+            <a:r>
+              <a:rPr kumimoji="0" lang="en-US" altLang="en-US" sz="1800" b="0" i="0" u="none" strike="noStrike" cap="none" normalizeH="0" baseline="0">
+                <a:ln>
+                  <a:noFill/>
+                </a:ln>
+                <a:solidFill>
+                  <a:srgbClr val="A9B7C6"/>
+                </a:solidFill>
+                <a:effectLst/>
+                <a:latin typeface="JetBrains Mono"/>
+              </a:rPr>
+              <a:t>    </a:t>
+            </a:r>
+            <a:r>
+              <a:rPr kumimoji="0" lang="en-US" altLang="en-US" sz="1800" b="0" i="0" u="none" strike="noStrike" cap="none" normalizeH="0" baseline="0">
+                <a:ln>
+                  <a:noFill/>
+                </a:ln>
+                <a:solidFill>
+                  <a:srgbClr val="CC7832"/>
+                </a:solidFill>
+                <a:effectLst/>
+                <a:latin typeface="JetBrains Mono"/>
+              </a:rPr>
+              <a:t>public </a:t>
+            </a:r>
+            <a:r>
+              <a:rPr kumimoji="0" lang="en-US" altLang="en-US" sz="1800" b="0" i="0" u="none" strike="noStrike" cap="none" normalizeH="0" baseline="0">
+                <a:ln>
+                  <a:noFill/>
+                </a:ln>
+                <a:solidFill>
+                  <a:srgbClr val="A9B7C6"/>
+                </a:solidFill>
+                <a:effectLst/>
+                <a:latin typeface="JetBrains Mono"/>
+              </a:rPr>
+              <a:t>String </a:t>
+            </a:r>
+            <a:r>
+              <a:rPr kumimoji="0" lang="en-US" altLang="en-US" sz="1800" b="0" i="0" u="none" strike="noStrike" cap="none" normalizeH="0" baseline="0">
+                <a:ln>
+                  <a:noFill/>
+                </a:ln>
+                <a:solidFill>
+                  <a:srgbClr val="FFC66D"/>
+                </a:solidFill>
+                <a:effectLst/>
+                <a:latin typeface="JetBrains Mono"/>
+              </a:rPr>
+              <a:t>getName</a:t>
+            </a:r>
+            <a:r>
+              <a:rPr kumimoji="0" lang="en-US" altLang="en-US" sz="1800" b="0" i="0" u="none" strike="noStrike" cap="none" normalizeH="0" baseline="0">
+                <a:ln>
+                  <a:noFill/>
+                </a:ln>
+                <a:solidFill>
+                  <a:srgbClr val="A9B7C6"/>
+                </a:solidFill>
+                <a:effectLst/>
+                <a:latin typeface="JetBrains Mono"/>
+              </a:rPr>
+              <a:t>(){ </a:t>
+            </a:r>
+            <a:r>
+              <a:rPr kumimoji="0" lang="en-US" altLang="en-US" sz="1800" b="0" i="0" u="none" strike="noStrike" cap="none" normalizeH="0" baseline="0">
+                <a:ln>
+                  <a:noFill/>
+                </a:ln>
+                <a:solidFill>
+                  <a:srgbClr val="CC7832"/>
+                </a:solidFill>
+                <a:effectLst/>
+                <a:latin typeface="JetBrains Mono"/>
+              </a:rPr>
+              <a:t>return </a:t>
+            </a:r>
+            <a:r>
+              <a:rPr kumimoji="0" lang="en-US" altLang="en-US" sz="1800" b="0" i="0" u="none" strike="noStrike" cap="none" normalizeH="0" baseline="0">
+                <a:ln>
+                  <a:noFill/>
+                </a:ln>
+                <a:solidFill>
+                  <a:srgbClr val="9876AA"/>
+                </a:solidFill>
+                <a:effectLst/>
+                <a:latin typeface="JetBrains Mono"/>
+              </a:rPr>
+              <a:t>name</a:t>
+            </a:r>
+            <a:r>
+              <a:rPr kumimoji="0" lang="en-US" altLang="en-US" sz="1800" b="0" i="0" u="none" strike="noStrike" cap="none" normalizeH="0" baseline="0">
+                <a:ln>
+                  <a:noFill/>
+                </a:ln>
+                <a:solidFill>
+                  <a:srgbClr val="CC7832"/>
+                </a:solidFill>
+                <a:effectLst/>
+                <a:latin typeface="JetBrains Mono"/>
+              </a:rPr>
+              <a:t>; </a:t>
+            </a:r>
+            <a:r>
+              <a:rPr kumimoji="0" lang="en-US" altLang="en-US" sz="1800" b="0" i="0" u="none" strike="noStrike" cap="none" normalizeH="0" baseline="0">
+                <a:ln>
+                  <a:noFill/>
+                </a:ln>
+                <a:solidFill>
+                  <a:srgbClr val="A9B7C6"/>
+                </a:solidFill>
+                <a:effectLst/>
+                <a:latin typeface="JetBrains Mono"/>
+              </a:rPr>
+              <a:t>}</a:t>
+            </a:r>
+            <a:br>
+              <a:rPr kumimoji="0" lang="en-US" altLang="en-US" sz="1800" b="0" i="0" u="none" strike="noStrike" cap="none" normalizeH="0" baseline="0">
+                <a:ln>
+                  <a:noFill/>
+                </a:ln>
+                <a:solidFill>
+                  <a:srgbClr val="A9B7C6"/>
+                </a:solidFill>
+                <a:effectLst/>
+                <a:latin typeface="JetBrains Mono"/>
+              </a:rPr>
+            </a:br>
+            <a:r>
+              <a:rPr kumimoji="0" lang="en-US" altLang="en-US" sz="1800" b="0" i="0" u="none" strike="noStrike" cap="none" normalizeH="0" baseline="0">
+                <a:ln>
+                  <a:noFill/>
+                </a:ln>
+                <a:solidFill>
+                  <a:srgbClr val="A9B7C6"/>
+                </a:solidFill>
+                <a:effectLst/>
+                <a:latin typeface="JetBrains Mono"/>
+              </a:rPr>
+              <a:t>    </a:t>
+            </a:r>
+            <a:r>
+              <a:rPr kumimoji="0" lang="en-US" altLang="en-US" sz="1800" b="0" i="0" u="none" strike="noStrike" cap="none" normalizeH="0" baseline="0">
+                <a:ln>
+                  <a:noFill/>
+                </a:ln>
+                <a:solidFill>
+                  <a:srgbClr val="BBB529"/>
+                </a:solidFill>
+                <a:effectLst/>
+                <a:latin typeface="JetBrains Mono"/>
+              </a:rPr>
+              <a:t>@Override</a:t>
+            </a:r>
+            <a:br>
+              <a:rPr kumimoji="0" lang="en-US" altLang="en-US" sz="1800" b="0" i="0" u="none" strike="noStrike" cap="none" normalizeH="0" baseline="0">
+                <a:ln>
+                  <a:noFill/>
+                </a:ln>
+                <a:solidFill>
+                  <a:srgbClr val="BBB529"/>
+                </a:solidFill>
+                <a:effectLst/>
+                <a:latin typeface="JetBrains Mono"/>
+              </a:rPr>
+            </a:br>
+            <a:r>
+              <a:rPr kumimoji="0" lang="en-US" altLang="en-US" sz="1800" b="0" i="0" u="none" strike="noStrike" cap="none" normalizeH="0" baseline="0">
+                <a:ln>
+                  <a:noFill/>
+                </a:ln>
+                <a:solidFill>
+                  <a:srgbClr val="BBB529"/>
+                </a:solidFill>
+                <a:effectLst/>
+                <a:latin typeface="JetBrains Mono"/>
+              </a:rPr>
+              <a:t>    </a:t>
+            </a:r>
+            <a:r>
+              <a:rPr kumimoji="0" lang="en-US" altLang="en-US" sz="1800" b="0" i="0" u="none" strike="noStrike" cap="none" normalizeH="0" baseline="0">
+                <a:ln>
+                  <a:noFill/>
+                </a:ln>
+                <a:solidFill>
+                  <a:srgbClr val="CC7832"/>
+                </a:solidFill>
+                <a:effectLst/>
+                <a:latin typeface="JetBrains Mono"/>
+              </a:rPr>
+              <a:t>public int </a:t>
+            </a:r>
+            <a:r>
+              <a:rPr kumimoji="0" lang="en-US" altLang="en-US" sz="1800" b="0" i="0" u="none" strike="noStrike" cap="none" normalizeH="0" baseline="0">
+                <a:ln>
+                  <a:noFill/>
+                </a:ln>
+                <a:solidFill>
+                  <a:srgbClr val="FFC66D"/>
+                </a:solidFill>
+                <a:effectLst/>
+                <a:latin typeface="JetBrains Mono"/>
+              </a:rPr>
+              <a:t>compareTo</a:t>
+            </a:r>
+            <a:r>
+              <a:rPr kumimoji="0" lang="en-US" altLang="en-US" sz="1800" b="0" i="0" u="none" strike="noStrike" cap="none" normalizeH="0" baseline="0">
+                <a:ln>
+                  <a:noFill/>
+                </a:ln>
+                <a:solidFill>
+                  <a:srgbClr val="A9B7C6"/>
+                </a:solidFill>
+                <a:effectLst/>
+                <a:latin typeface="JetBrains Mono"/>
+              </a:rPr>
+              <a:t>(Country o) {</a:t>
+            </a:r>
+            <a:br>
+              <a:rPr kumimoji="0" lang="en-US" altLang="en-US" sz="1800" b="0" i="0" u="none" strike="noStrike" cap="none" normalizeH="0" baseline="0">
+                <a:ln>
+                  <a:noFill/>
+                </a:ln>
+                <a:solidFill>
+                  <a:srgbClr val="A9B7C6"/>
+                </a:solidFill>
+                <a:effectLst/>
+                <a:latin typeface="JetBrains Mono"/>
+              </a:rPr>
+            </a:br>
+            <a:r>
+              <a:rPr kumimoji="0" lang="en-US" altLang="en-US" sz="1800" b="0" i="0" u="none" strike="noStrike" cap="none" normalizeH="0" baseline="0">
+                <a:ln>
+                  <a:noFill/>
+                </a:ln>
+                <a:solidFill>
+                  <a:srgbClr val="A9B7C6"/>
+                </a:solidFill>
+                <a:effectLst/>
+                <a:latin typeface="JetBrains Mono"/>
+              </a:rPr>
+              <a:t>        </a:t>
+            </a:r>
+            <a:r>
+              <a:rPr kumimoji="0" lang="en-US" altLang="en-US" sz="1800" b="0" i="0" u="none" strike="noStrike" cap="none" normalizeH="0" baseline="0">
+                <a:ln>
+                  <a:noFill/>
+                </a:ln>
+                <a:solidFill>
+                  <a:srgbClr val="808080"/>
+                </a:solidFill>
+                <a:effectLst/>
+                <a:latin typeface="JetBrains Mono"/>
+              </a:rPr>
+              <a:t>//needs to be implemented</a:t>
+            </a:r>
+            <a:br>
+              <a:rPr kumimoji="0" lang="en-US" altLang="en-US" sz="1800" b="0" i="0" u="none" strike="noStrike" cap="none" normalizeH="0" baseline="0">
+                <a:ln>
+                  <a:noFill/>
+                </a:ln>
+                <a:solidFill>
+                  <a:srgbClr val="808080"/>
+                </a:solidFill>
+                <a:effectLst/>
+                <a:latin typeface="JetBrains Mono"/>
+              </a:rPr>
+            </a:br>
+            <a:r>
+              <a:rPr kumimoji="0" lang="en-US" altLang="en-US" sz="1800" b="0" i="0" u="none" strike="noStrike" cap="none" normalizeH="0" baseline="0">
+                <a:ln>
+                  <a:noFill/>
+                </a:ln>
+                <a:solidFill>
+                  <a:srgbClr val="808080"/>
+                </a:solidFill>
+                <a:effectLst/>
+                <a:latin typeface="JetBrains Mono"/>
+              </a:rPr>
+              <a:t>    </a:t>
+            </a:r>
+            <a:r>
+              <a:rPr kumimoji="0" lang="en-US" altLang="en-US" sz="1800" b="0" i="0" u="none" strike="noStrike" cap="none" normalizeH="0" baseline="0">
+                <a:ln>
+                  <a:noFill/>
+                </a:ln>
+                <a:solidFill>
+                  <a:srgbClr val="A9B7C6"/>
+                </a:solidFill>
+                <a:effectLst/>
+                <a:latin typeface="JetBrains Mono"/>
+              </a:rPr>
+              <a:t>}</a:t>
+            </a:r>
+            <a:br>
+              <a:rPr kumimoji="0" lang="en-US" altLang="en-US" sz="1800" b="0" i="0" u="none" strike="noStrike" cap="none" normalizeH="0" baseline="0">
+                <a:ln>
+                  <a:noFill/>
+                </a:ln>
+                <a:solidFill>
+                  <a:srgbClr val="A9B7C6"/>
+                </a:solidFill>
+                <a:effectLst/>
+                <a:latin typeface="JetBrains Mono"/>
+              </a:rPr>
+            </a:br>
+            <a:r>
+              <a:rPr kumimoji="0" lang="en-US" altLang="en-US" sz="1800" b="0" i="0" u="none" strike="noStrike" cap="none" normalizeH="0" baseline="0">
+                <a:ln>
+                  <a:noFill/>
+                </a:ln>
+                <a:solidFill>
+                  <a:srgbClr val="A9B7C6"/>
+                </a:solidFill>
+                <a:effectLst/>
+                <a:latin typeface="JetBrains Mono"/>
+              </a:rPr>
+              <a:t>    </a:t>
+            </a:r>
+            <a:r>
+              <a:rPr kumimoji="0" lang="en-US" altLang="en-US" sz="1800" b="0" i="0" u="none" strike="noStrike" cap="none" normalizeH="0" baseline="0">
+                <a:ln>
+                  <a:noFill/>
+                </a:ln>
+                <a:solidFill>
+                  <a:srgbClr val="BBB529"/>
+                </a:solidFill>
+                <a:effectLst/>
+                <a:latin typeface="JetBrains Mono"/>
+              </a:rPr>
+              <a:t>@Override</a:t>
+            </a:r>
+            <a:br>
+              <a:rPr kumimoji="0" lang="en-US" altLang="en-US" sz="1800" b="0" i="0" u="none" strike="noStrike" cap="none" normalizeH="0" baseline="0">
+                <a:ln>
+                  <a:noFill/>
+                </a:ln>
+                <a:solidFill>
+                  <a:srgbClr val="BBB529"/>
+                </a:solidFill>
+                <a:effectLst/>
+                <a:latin typeface="JetBrains Mono"/>
+              </a:rPr>
+            </a:br>
+            <a:r>
+              <a:rPr kumimoji="0" lang="en-US" altLang="en-US" sz="1800" b="0" i="0" u="none" strike="noStrike" cap="none" normalizeH="0" baseline="0">
+                <a:ln>
+                  <a:noFill/>
+                </a:ln>
+                <a:solidFill>
+                  <a:srgbClr val="BBB529"/>
+                </a:solidFill>
+                <a:effectLst/>
+                <a:latin typeface="JetBrains Mono"/>
+              </a:rPr>
+              <a:t>    </a:t>
+            </a:r>
+            <a:r>
+              <a:rPr kumimoji="0" lang="en-US" altLang="en-US" sz="1800" b="0" i="0" u="none" strike="noStrike" cap="none" normalizeH="0" baseline="0">
+                <a:ln>
+                  <a:noFill/>
+                </a:ln>
+                <a:solidFill>
+                  <a:srgbClr val="CC7832"/>
+                </a:solidFill>
+                <a:effectLst/>
+                <a:latin typeface="JetBrains Mono"/>
+              </a:rPr>
+              <a:t>public boolean </a:t>
+            </a:r>
+            <a:r>
+              <a:rPr kumimoji="0" lang="en-US" altLang="en-US" sz="1800" b="0" i="0" u="none" strike="noStrike" cap="none" normalizeH="0" baseline="0">
+                <a:ln>
+                  <a:noFill/>
+                </a:ln>
+                <a:solidFill>
+                  <a:srgbClr val="FFC66D"/>
+                </a:solidFill>
+                <a:effectLst/>
+                <a:latin typeface="JetBrains Mono"/>
+              </a:rPr>
+              <a:t>equals</a:t>
+            </a:r>
+            <a:r>
+              <a:rPr kumimoji="0" lang="en-US" altLang="en-US" sz="1800" b="0" i="0" u="none" strike="noStrike" cap="none" normalizeH="0" baseline="0">
+                <a:ln>
+                  <a:noFill/>
+                </a:ln>
+                <a:solidFill>
+                  <a:srgbClr val="A9B7C6"/>
+                </a:solidFill>
+                <a:effectLst/>
+                <a:latin typeface="JetBrains Mono"/>
+              </a:rPr>
+              <a:t>(Object obj) {</a:t>
+            </a:r>
+            <a:br>
+              <a:rPr kumimoji="0" lang="en-US" altLang="en-US" sz="1800" b="0" i="0" u="none" strike="noStrike" cap="none" normalizeH="0" baseline="0">
+                <a:ln>
+                  <a:noFill/>
+                </a:ln>
+                <a:solidFill>
+                  <a:srgbClr val="A9B7C6"/>
+                </a:solidFill>
+                <a:effectLst/>
+                <a:latin typeface="JetBrains Mono"/>
+              </a:rPr>
+            </a:br>
+            <a:r>
+              <a:rPr kumimoji="0" lang="en-US" altLang="en-US" sz="1800" b="0" i="0" u="none" strike="noStrike" cap="none" normalizeH="0" baseline="0">
+                <a:ln>
+                  <a:noFill/>
+                </a:ln>
+                <a:solidFill>
+                  <a:srgbClr val="A9B7C6"/>
+                </a:solidFill>
+                <a:effectLst/>
+                <a:latin typeface="JetBrains Mono"/>
+              </a:rPr>
+              <a:t>        </a:t>
+            </a:r>
+            <a:r>
+              <a:rPr kumimoji="0" lang="en-US" altLang="en-US" sz="1800" b="0" i="0" u="none" strike="noStrike" cap="none" normalizeH="0" baseline="0">
+                <a:ln>
+                  <a:noFill/>
+                </a:ln>
+                <a:solidFill>
+                  <a:srgbClr val="808080"/>
+                </a:solidFill>
+                <a:effectLst/>
+                <a:latin typeface="JetBrains Mono"/>
+              </a:rPr>
+              <a:t>//needs to be implemented</a:t>
+            </a:r>
+            <a:br>
+              <a:rPr kumimoji="0" lang="en-US" altLang="en-US" sz="1800" b="0" i="0" u="none" strike="noStrike" cap="none" normalizeH="0" baseline="0">
+                <a:ln>
+                  <a:noFill/>
+                </a:ln>
+                <a:solidFill>
+                  <a:srgbClr val="808080"/>
+                </a:solidFill>
+                <a:effectLst/>
+                <a:latin typeface="JetBrains Mono"/>
+              </a:rPr>
+            </a:br>
+            <a:r>
+              <a:rPr kumimoji="0" lang="en-US" altLang="en-US" sz="1800" b="0" i="0" u="none" strike="noStrike" cap="none" normalizeH="0" baseline="0">
+                <a:ln>
+                  <a:noFill/>
+                </a:ln>
+                <a:solidFill>
+                  <a:srgbClr val="808080"/>
+                </a:solidFill>
+                <a:effectLst/>
+                <a:latin typeface="JetBrains Mono"/>
+              </a:rPr>
+              <a:t>    </a:t>
+            </a:r>
+            <a:r>
+              <a:rPr kumimoji="0" lang="en-US" altLang="en-US" sz="1800" b="0" i="0" u="none" strike="noStrike" cap="none" normalizeH="0" baseline="0">
+                <a:ln>
+                  <a:noFill/>
+                </a:ln>
+                <a:solidFill>
+                  <a:srgbClr val="A9B7C6"/>
+                </a:solidFill>
+                <a:effectLst/>
+                <a:latin typeface="JetBrains Mono"/>
+              </a:rPr>
+              <a:t>}</a:t>
+            </a:r>
+            <a:br>
+              <a:rPr kumimoji="0" lang="en-US" altLang="en-US" sz="1800" b="0" i="0" u="none" strike="noStrike" cap="none" normalizeH="0" baseline="0">
+                <a:ln>
+                  <a:noFill/>
+                </a:ln>
+                <a:solidFill>
+                  <a:srgbClr val="A9B7C6"/>
+                </a:solidFill>
+                <a:effectLst/>
+                <a:latin typeface="JetBrains Mono"/>
+              </a:rPr>
+            </a:br>
+            <a:r>
+              <a:rPr kumimoji="0" lang="en-US" altLang="en-US" sz="1800" b="0" i="0" u="none" strike="noStrike" cap="none" normalizeH="0" baseline="0">
+                <a:ln>
+                  <a:noFill/>
+                </a:ln>
+                <a:solidFill>
+                  <a:srgbClr val="A9B7C6"/>
+                </a:solidFill>
+                <a:effectLst/>
+                <a:latin typeface="JetBrains Mono"/>
+              </a:rPr>
+              <a:t>    </a:t>
+            </a:r>
+            <a:r>
+              <a:rPr kumimoji="0" lang="en-US" altLang="en-US" sz="1800" b="0" i="0" u="none" strike="noStrike" cap="none" normalizeH="0" baseline="0">
+                <a:ln>
+                  <a:noFill/>
+                </a:ln>
+                <a:solidFill>
+                  <a:srgbClr val="CC7832"/>
+                </a:solidFill>
+                <a:effectLst/>
+                <a:latin typeface="JetBrains Mono"/>
+              </a:rPr>
+              <a:t>public </a:t>
+            </a:r>
+            <a:r>
+              <a:rPr kumimoji="0" lang="en-US" altLang="en-US" sz="1800" b="0" i="0" u="none" strike="noStrike" cap="none" normalizeH="0" baseline="0">
+                <a:ln>
+                  <a:noFill/>
+                </a:ln>
+                <a:solidFill>
+                  <a:srgbClr val="A9B7C6"/>
+                </a:solidFill>
+                <a:effectLst/>
+                <a:latin typeface="JetBrains Mono"/>
+              </a:rPr>
+              <a:t>String </a:t>
+            </a:r>
+            <a:r>
+              <a:rPr kumimoji="0" lang="en-US" altLang="en-US" sz="1800" b="0" i="0" u="none" strike="noStrike" cap="none" normalizeH="0" baseline="0">
+                <a:ln>
+                  <a:noFill/>
+                </a:ln>
+                <a:solidFill>
+                  <a:srgbClr val="FFC66D"/>
+                </a:solidFill>
+                <a:effectLst/>
+                <a:latin typeface="JetBrains Mono"/>
+              </a:rPr>
+              <a:t>toString</a:t>
+            </a:r>
+            <a:r>
+              <a:rPr kumimoji="0" lang="en-US" altLang="en-US" sz="1800" b="0" i="0" u="none" strike="noStrike" cap="none" normalizeH="0" baseline="0">
+                <a:ln>
+                  <a:noFill/>
+                </a:ln>
+                <a:solidFill>
+                  <a:srgbClr val="A9B7C6"/>
+                </a:solidFill>
+                <a:effectLst/>
+                <a:latin typeface="JetBrains Mono"/>
+              </a:rPr>
+              <a:t>(){</a:t>
+            </a:r>
+            <a:br>
+              <a:rPr kumimoji="0" lang="en-US" altLang="en-US" sz="1800" b="0" i="0" u="none" strike="noStrike" cap="none" normalizeH="0" baseline="0">
+                <a:ln>
+                  <a:noFill/>
+                </a:ln>
+                <a:solidFill>
+                  <a:srgbClr val="A9B7C6"/>
+                </a:solidFill>
+                <a:effectLst/>
+                <a:latin typeface="JetBrains Mono"/>
+              </a:rPr>
+            </a:br>
+            <a:r>
+              <a:rPr kumimoji="0" lang="en-US" altLang="en-US" sz="1800" b="0" i="0" u="none" strike="noStrike" cap="none" normalizeH="0" baseline="0">
+                <a:ln>
+                  <a:noFill/>
+                </a:ln>
+                <a:solidFill>
+                  <a:srgbClr val="A9B7C6"/>
+                </a:solidFill>
+                <a:effectLst/>
+                <a:latin typeface="JetBrains Mono"/>
+              </a:rPr>
+              <a:t>        </a:t>
+            </a:r>
+            <a:r>
+              <a:rPr kumimoji="0" lang="en-US" altLang="en-US" sz="1800" b="0" i="0" u="none" strike="noStrike" cap="none" normalizeH="0" baseline="0">
+                <a:ln>
+                  <a:noFill/>
+                </a:ln>
+                <a:solidFill>
+                  <a:srgbClr val="CC7832"/>
+                </a:solidFill>
+                <a:effectLst/>
+                <a:latin typeface="JetBrains Mono"/>
+              </a:rPr>
+              <a:t>return </a:t>
+            </a:r>
+            <a:r>
+              <a:rPr kumimoji="0" lang="en-US" altLang="en-US" sz="1800" b="0" i="0" u="none" strike="noStrike" cap="none" normalizeH="0" baseline="0">
+                <a:ln>
+                  <a:noFill/>
+                </a:ln>
+                <a:solidFill>
+                  <a:srgbClr val="6A8759"/>
+                </a:solidFill>
+                <a:effectLst/>
+                <a:latin typeface="JetBrains Mono"/>
+              </a:rPr>
+              <a:t>"name: " </a:t>
+            </a:r>
+            <a:r>
+              <a:rPr kumimoji="0" lang="en-US" altLang="en-US" sz="1800" b="0" i="0" u="none" strike="noStrike" cap="none" normalizeH="0" baseline="0">
+                <a:ln>
+                  <a:noFill/>
+                </a:ln>
+                <a:solidFill>
+                  <a:srgbClr val="A9B7C6"/>
+                </a:solidFill>
+                <a:effectLst/>
+                <a:latin typeface="JetBrains Mono"/>
+              </a:rPr>
+              <a:t>+ </a:t>
+            </a:r>
+            <a:r>
+              <a:rPr kumimoji="0" lang="en-US" altLang="en-US" sz="1800" b="0" i="0" u="none" strike="noStrike" cap="none" normalizeH="0" baseline="0">
+                <a:ln>
+                  <a:noFill/>
+                </a:ln>
+                <a:solidFill>
+                  <a:srgbClr val="9876AA"/>
+                </a:solidFill>
+                <a:effectLst/>
+                <a:latin typeface="JetBrains Mono"/>
+              </a:rPr>
+              <a:t>name </a:t>
+            </a:r>
+            <a:r>
+              <a:rPr kumimoji="0" lang="en-US" altLang="en-US" sz="1800" b="0" i="0" u="none" strike="noStrike" cap="none" normalizeH="0" baseline="0">
+                <a:ln>
+                  <a:noFill/>
+                </a:ln>
+                <a:solidFill>
+                  <a:srgbClr val="A9B7C6"/>
+                </a:solidFill>
+                <a:effectLst/>
+                <a:latin typeface="JetBrains Mono"/>
+              </a:rPr>
+              <a:t>+ </a:t>
+            </a:r>
+            <a:r>
+              <a:rPr kumimoji="0" lang="en-US" altLang="en-US" sz="1800" b="0" i="0" u="none" strike="noStrike" cap="none" normalizeH="0" baseline="0">
+                <a:ln>
+                  <a:noFill/>
+                </a:ln>
+                <a:solidFill>
+                  <a:srgbClr val="6A8759"/>
+                </a:solidFill>
+                <a:effectLst/>
+                <a:latin typeface="JetBrains Mono"/>
+              </a:rPr>
+              <a:t>" area: " </a:t>
+            </a:r>
+            <a:r>
+              <a:rPr kumimoji="0" lang="en-US" altLang="en-US" sz="1800" b="0" i="0" u="none" strike="noStrike" cap="none" normalizeH="0" baseline="0">
+                <a:ln>
+                  <a:noFill/>
+                </a:ln>
+                <a:solidFill>
+                  <a:srgbClr val="A9B7C6"/>
+                </a:solidFill>
+                <a:effectLst/>
+                <a:latin typeface="JetBrains Mono"/>
+              </a:rPr>
+              <a:t>+ </a:t>
+            </a:r>
+            <a:r>
+              <a:rPr kumimoji="0" lang="en-US" altLang="en-US" sz="1800" b="0" i="0" u="none" strike="noStrike" cap="none" normalizeH="0" baseline="0">
+                <a:ln>
+                  <a:noFill/>
+                </a:ln>
+                <a:solidFill>
+                  <a:srgbClr val="9876AA"/>
+                </a:solidFill>
+                <a:effectLst/>
+                <a:latin typeface="JetBrains Mono"/>
+              </a:rPr>
+              <a:t>area</a:t>
+            </a:r>
+            <a:r>
+              <a:rPr kumimoji="0" lang="en-US" altLang="en-US" sz="1800" b="0" i="0" u="none" strike="noStrike" cap="none" normalizeH="0" baseline="0">
+                <a:ln>
+                  <a:noFill/>
+                </a:ln>
+                <a:solidFill>
+                  <a:srgbClr val="CC7832"/>
+                </a:solidFill>
+                <a:effectLst/>
+                <a:latin typeface="JetBrains Mono"/>
+              </a:rPr>
+              <a:t>;</a:t>
+            </a:r>
+            <a:br>
+              <a:rPr kumimoji="0" lang="en-US" altLang="en-US" sz="1800" b="0" i="0" u="none" strike="noStrike" cap="none" normalizeH="0" baseline="0">
+                <a:ln>
+                  <a:noFill/>
+                </a:ln>
+                <a:solidFill>
+                  <a:srgbClr val="CC7832"/>
+                </a:solidFill>
+                <a:effectLst/>
+                <a:latin typeface="JetBrains Mono"/>
+              </a:rPr>
+            </a:br>
+            <a:r>
+              <a:rPr kumimoji="0" lang="en-US" altLang="en-US" sz="1800" b="0" i="0" u="none" strike="noStrike" cap="none" normalizeH="0" baseline="0">
+                <a:ln>
+                  <a:noFill/>
+                </a:ln>
+                <a:solidFill>
+                  <a:srgbClr val="CC7832"/>
+                </a:solidFill>
+                <a:effectLst/>
+                <a:latin typeface="JetBrains Mono"/>
+              </a:rPr>
+              <a:t>    </a:t>
+            </a:r>
+            <a:r>
+              <a:rPr kumimoji="0" lang="en-US" altLang="en-US" sz="1800" b="0" i="0" u="none" strike="noStrike" cap="none" normalizeH="0" baseline="0">
+                <a:ln>
+                  <a:noFill/>
+                </a:ln>
+                <a:solidFill>
+                  <a:srgbClr val="A9B7C6"/>
+                </a:solidFill>
+                <a:effectLst/>
+                <a:latin typeface="JetBrains Mono"/>
+              </a:rPr>
+              <a:t>}</a:t>
+            </a:r>
+            <a:br>
+              <a:rPr kumimoji="0" lang="en-US" altLang="en-US" sz="1800" b="0" i="0" u="none" strike="noStrike" cap="none" normalizeH="0" baseline="0">
+                <a:ln>
+                  <a:noFill/>
+                </a:ln>
+                <a:solidFill>
+                  <a:srgbClr val="A9B7C6"/>
+                </a:solidFill>
+                <a:effectLst/>
+                <a:latin typeface="JetBrains Mono"/>
+              </a:rPr>
+            </a:br>
+            <a:r>
+              <a:rPr kumimoji="0" lang="en-US" altLang="en-US" sz="1800" b="0" i="0" u="none" strike="noStrike" cap="none" normalizeH="0" baseline="0">
+                <a:ln>
+                  <a:noFill/>
+                </a:ln>
+                <a:solidFill>
+                  <a:srgbClr val="A9B7C6"/>
+                </a:solidFill>
+                <a:effectLst/>
+                <a:latin typeface="JetBrains Mono"/>
+              </a:rPr>
+              <a:t>}</a:t>
+            </a:r>
+            <a:endParaRPr kumimoji="0" lang="en-US" altLang="en-US" sz="1800" b="0" i="0" u="none" strike="noStrike" cap="none" normalizeH="0" baseline="0">
+              <a:ln>
+                <a:noFill/>
+              </a:ln>
+              <a:solidFill>
+                <a:schemeClr val="tx1"/>
+              </a:solidFill>
+              <a:effectLst/>
+              <a:latin typeface="Arial" panose="020B0604020202020204" pitchFamily="34" charset="0"/>
+            </a:endParaRPr>
+          </a:p>
+        </p:txBody>
+      </p:sp>
+    </p:spTree>
+    <p:extLst>
+      <p:ext uri="{BB962C8B-B14F-4D97-AF65-F5344CB8AC3E}">
+        <p14:creationId xmlns:p14="http://schemas.microsoft.com/office/powerpoint/2010/main" val="1035711711"/>
+      </p:ext>
+    </p:extLst>
+  </p:cSld>
+  <p:clrMapOvr>
+    <a:masterClrMapping/>
+  </p:clrMapOvr>
+  <mc:AlternateContent xmlns:mc="http://schemas.openxmlformats.org/markup-compatibility/2006" xmlns:p14="http://schemas.microsoft.com/office/powerpoint/2010/main">
+    <mc:Choice Requires="p14">
+      <p:transition p14:dur="300">
+        <p:fade/>
+      </p:transition>
+    </mc:Choice>
+    <mc:Fallback xmlns="">
+      <p:transition>
+        <p:fade/>
+      </p:transition>
+    </mc:Fallback>
+  </mc:AlternateContent>
+</p:sld>
+</file>
+
+<file path=ppt/slides/slide11.xml><?xml version="1.0" encoding="utf-8"?>
+<p:sld xmlns:a="http://schemas.openxmlformats.org/drawingml/2006/main" xmlns:r="http://schemas.openxmlformats.org/officeDocument/2006/relationships" xmlns:p="http://schemas.openxmlformats.org/presentationml/2006/main">
+  <p:cSld>
+    <p:spTree>
+      <p:nvGrpSpPr>
+        <p:cNvPr id="1" name=""/>
+        <p:cNvGrpSpPr/>
+        <p:nvPr/>
+      </p:nvGrpSpPr>
+      <p:grpSpPr>
+        <a:xfrm>
+          <a:off x="0" y="0"/>
+          <a:ext cx="0" cy="0"/>
+          <a:chOff x="0" y="0"/>
+          <a:chExt cx="0" cy="0"/>
+        </a:xfrm>
+      </p:grpSpPr>
+      <p:sp>
+        <p:nvSpPr>
+          <p:cNvPr id="2" name="Title 1">
+            <a:extLst>
+              <a:ext uri="{FF2B5EF4-FFF2-40B4-BE49-F238E27FC236}">
+                <a16:creationId xmlns:a16="http://schemas.microsoft.com/office/drawing/2014/main" id="{0A758FF7-8D14-DF4E-A32F-9B533CE1BFA8}"/>
+              </a:ext>
+            </a:extLst>
+          </p:cNvPr>
+          <p:cNvSpPr>
+            <a:spLocks noGrp="1"/>
+          </p:cNvSpPr>
+          <p:nvPr>
+            <p:ph type="title"/>
+          </p:nvPr>
+        </p:nvSpPr>
         <p:spPr>
           <a:xfrm>
             <a:off x="372893" y="76246"/>
@@ -10369,7 +11975,7 @@
         </p:spPr>
         <p:txBody>
           <a:bodyPr>
-            <a:normAutofit fontScale="85000" lnSpcReduction="20000"/>
+            <a:normAutofit fontScale="77500" lnSpcReduction="20000"/>
           </a:bodyPr>
           <a:lstStyle/>
           <a:p>
@@ -10430,6 +12036,21 @@
             <a:r>
               <a:rPr lang="en-US" dirty="0"/>
               <a:t>Help Desk Closes on the *due date* of the last assignment (not late window)</a:t>
+            </a:r>
+          </a:p>
+          <a:p>
+            <a:pPr lvl="2"/>
+            <a:r>
+              <a:rPr lang="en-US" dirty="0"/>
+              <a:t>HELP DESK CLOSES - December 9</a:t>
+            </a:r>
+            <a:r>
+              <a:rPr lang="en-US" baseline="30000" dirty="0"/>
+              <a:t>th</a:t>
+            </a:r>
+            <a:r>
+              <a:rPr lang="en-US" dirty="0"/>
+              <a:t>! </a:t>
             </a:r>
           </a:p>
           <a:p>
@@ -15908,8 +17529,8 @@
         </p:nvSpPr>
         <p:spPr>
           <a:xfrm>
-            <a:off x="628075" y="1776683"/>
-            <a:ext cx="9099021" cy="1453988"/>
+            <a:off x="628075" y="1529405"/>
+            <a:ext cx="9099021" cy="1940211"/>
           </a:xfrm>
         </p:spPr>
         <p:txBody>
@@ -15925,6 +17546,12 @@
             <a:r>
               <a:rPr lang="en-US" dirty="0"/>
               <a:t>if next element is less, swap, and keep doing it</a:t>
+            </a:r>
+          </a:p>
+          <a:p>
+            <a:r>
+              <a:rPr lang="en-US" dirty="0"/>
+              <a:t>if the next element is more, start moving that element up</a:t>
             </a:r>
           </a:p>
           <a:p>
@@ -17050,6 +18677,547 @@
           <p:cNvPr id="2" name="Title 1">
             <a:extLst>
               <a:ext uri="{FF2B5EF4-FFF2-40B4-BE49-F238E27FC236}">
+                <a16:creationId xmlns:a16="http://schemas.microsoft.com/office/drawing/2014/main" id="{19F613E4-61AD-3C4B-801C-D08A6B51D9D9}"/>
+              </a:ext>
+            </a:extLst>
+          </p:cNvPr>
+          <p:cNvSpPr>
+            <a:spLocks noGrp="1"/>
+          </p:cNvSpPr>
+          <p:nvPr>
+            <p:ph type="title"/>
+          </p:nvPr>
+        </p:nvSpPr>
+        <p:spPr/>
+        <p:txBody>
+          <a:bodyPr/>
+          <a:lstStyle/>
+          <a:p>
+            <a:r>
+              <a:rPr lang="en-US" dirty="0"/>
+              <a:t>Practice 1</a:t>
+            </a:r>
+          </a:p>
+        </p:txBody>
+      </p:sp>
+      <p:sp>
+        <p:nvSpPr>
+          <p:cNvPr id="3" name="Text Placeholder 2">
+            <a:extLst>
+              <a:ext uri="{FF2B5EF4-FFF2-40B4-BE49-F238E27FC236}">
+                <a16:creationId xmlns:a16="http://schemas.microsoft.com/office/drawing/2014/main" id="{F1E14A84-8C89-5E48-83FD-7BE731D80955}"/>
+              </a:ext>
+            </a:extLst>
+          </p:cNvPr>
+          <p:cNvSpPr>
+            <a:spLocks noGrp="1"/>
+          </p:cNvSpPr>
+          <p:nvPr>
+            <p:ph type="body" sz="quarter" idx="10"/>
+          </p:nvPr>
+        </p:nvSpPr>
+        <p:spPr>
+          <a:xfrm>
+            <a:off x="628075" y="1776683"/>
+            <a:ext cx="12561453" cy="481350"/>
+          </a:xfrm>
+        </p:spPr>
+        <p:txBody>
+          <a:bodyPr/>
+          <a:lstStyle/>
+          <a:p>
+            <a:r>
+              <a:rPr lang="en-US" dirty="0"/>
+              <a:t>Given the following list write each ‘step’ (array) of the bubble sort</a:t>
+            </a:r>
+          </a:p>
+        </p:txBody>
+      </p:sp>
+      <p:sp>
+        <p:nvSpPr>
+          <p:cNvPr id="4" name="TextBox 3">
+            <a:extLst>
+              <a:ext uri="{FF2B5EF4-FFF2-40B4-BE49-F238E27FC236}">
+                <a16:creationId xmlns:a16="http://schemas.microsoft.com/office/drawing/2014/main" id="{4ADB71FC-D3C5-BB4F-82AA-5600F3C2BE14}"/>
+              </a:ext>
+            </a:extLst>
+          </p:cNvPr>
+          <p:cNvSpPr txBox="1"/>
+          <p:nvPr/>
+        </p:nvSpPr>
+        <p:spPr>
+          <a:xfrm>
+            <a:off x="4753114" y="2370939"/>
+            <a:ext cx="2300630" cy="400110"/>
+          </a:xfrm>
+          <a:prstGeom prst="rect">
+            <a:avLst/>
+          </a:prstGeom>
+          <a:noFill/>
+        </p:spPr>
+        <p:txBody>
+          <a:bodyPr wrap="none" rtlCol="0">
+            <a:spAutoFit/>
+          </a:bodyPr>
+          <a:lstStyle/>
+          <a:p>
+            <a:r>
+              <a:rPr lang="en-US" dirty="0">
+                <a:latin typeface="Consolas" panose="020B0609020204030204" pitchFamily="49" charset="0"/>
+                <a:cs typeface="Consolas" panose="020B0609020204030204" pitchFamily="49" charset="0"/>
+              </a:rPr>
+              <a:t>[3, 2, 5, 1, 8]</a:t>
+            </a:r>
+          </a:p>
+        </p:txBody>
+      </p:sp>
+      <p:sp>
+        <p:nvSpPr>
+          <p:cNvPr id="5" name="TextBox 4">
+            <a:extLst>
+              <a:ext uri="{FF2B5EF4-FFF2-40B4-BE49-F238E27FC236}">
+                <a16:creationId xmlns:a16="http://schemas.microsoft.com/office/drawing/2014/main" id="{2B958510-0F2B-EE4F-BF65-527683594EC4}"/>
+              </a:ext>
+            </a:extLst>
+          </p:cNvPr>
+          <p:cNvSpPr txBox="1"/>
+          <p:nvPr/>
+        </p:nvSpPr>
+        <p:spPr>
+          <a:xfrm>
+            <a:off x="1304359" y="3486090"/>
+            <a:ext cx="2300630" cy="400110"/>
+          </a:xfrm>
+          <a:prstGeom prst="rect">
+            <a:avLst/>
+          </a:prstGeom>
+          <a:noFill/>
+        </p:spPr>
+        <p:txBody>
+          <a:bodyPr wrap="none" rtlCol="0">
+            <a:spAutoFit/>
+          </a:bodyPr>
+          <a:lstStyle/>
+          <a:p>
+            <a:r>
+              <a:rPr lang="en-US" dirty="0">
+                <a:latin typeface="Consolas" panose="020B0609020204030204" pitchFamily="49" charset="0"/>
+                <a:cs typeface="Consolas" panose="020B0609020204030204" pitchFamily="49" charset="0"/>
+              </a:rPr>
+              <a:t>[2, 3, 5, 1, 8]</a:t>
+            </a:r>
+          </a:p>
+        </p:txBody>
+      </p:sp>
+      <p:sp>
+        <p:nvSpPr>
+          <p:cNvPr id="6" name="TextBox 5">
+            <a:extLst>
+              <a:ext uri="{FF2B5EF4-FFF2-40B4-BE49-F238E27FC236}">
+                <a16:creationId xmlns:a16="http://schemas.microsoft.com/office/drawing/2014/main" id="{1434C16A-ED46-944B-A558-855AC5BC12AB}"/>
+              </a:ext>
+            </a:extLst>
+          </p:cNvPr>
+          <p:cNvSpPr txBox="1"/>
+          <p:nvPr/>
+        </p:nvSpPr>
+        <p:spPr>
+          <a:xfrm>
+            <a:off x="1304359" y="3886200"/>
+            <a:ext cx="2300630" cy="400110"/>
+          </a:xfrm>
+          <a:prstGeom prst="rect">
+            <a:avLst/>
+          </a:prstGeom>
+          <a:noFill/>
+        </p:spPr>
+        <p:txBody>
+          <a:bodyPr wrap="none" rtlCol="0">
+            <a:spAutoFit/>
+          </a:bodyPr>
+          <a:lstStyle/>
+          <a:p>
+            <a:r>
+              <a:rPr lang="en-US" dirty="0">
+                <a:latin typeface="Consolas" panose="020B0609020204030204" pitchFamily="49" charset="0"/>
+                <a:cs typeface="Consolas" panose="020B0609020204030204" pitchFamily="49" charset="0"/>
+              </a:rPr>
+              <a:t>[2, 3, 1, 5, 8]</a:t>
+            </a:r>
+          </a:p>
+        </p:txBody>
+      </p:sp>
+      <p:sp>
+        <p:nvSpPr>
+          <p:cNvPr id="7" name="TextBox 6">
+            <a:extLst>
+              <a:ext uri="{FF2B5EF4-FFF2-40B4-BE49-F238E27FC236}">
+                <a16:creationId xmlns:a16="http://schemas.microsoft.com/office/drawing/2014/main" id="{2E60760C-F470-A544-BE16-86A47D66D228}"/>
+              </a:ext>
+            </a:extLst>
+          </p:cNvPr>
+          <p:cNvSpPr txBox="1"/>
+          <p:nvPr/>
+        </p:nvSpPr>
+        <p:spPr>
+          <a:xfrm>
+            <a:off x="1304359" y="4289132"/>
+            <a:ext cx="2300630" cy="400110"/>
+          </a:xfrm>
+          <a:prstGeom prst="rect">
+            <a:avLst/>
+          </a:prstGeom>
+          <a:noFill/>
+        </p:spPr>
+        <p:txBody>
+          <a:bodyPr wrap="none" rtlCol="0">
+            <a:spAutoFit/>
+          </a:bodyPr>
+          <a:lstStyle/>
+          <a:p>
+            <a:r>
+              <a:rPr lang="en-US" dirty="0">
+                <a:latin typeface="Consolas" panose="020B0609020204030204" pitchFamily="49" charset="0"/>
+                <a:cs typeface="Consolas" panose="020B0609020204030204" pitchFamily="49" charset="0"/>
+              </a:rPr>
+              <a:t>[2, 1, 3, 5, 8]</a:t>
+            </a:r>
+          </a:p>
+        </p:txBody>
+      </p:sp>
+      <p:sp>
+        <p:nvSpPr>
+          <p:cNvPr id="8" name="TextBox 7">
+            <a:extLst>
+              <a:ext uri="{FF2B5EF4-FFF2-40B4-BE49-F238E27FC236}">
+                <a16:creationId xmlns:a16="http://schemas.microsoft.com/office/drawing/2014/main" id="{53D5B0F2-2DA9-6840-85B7-22700D70E0A5}"/>
+              </a:ext>
+            </a:extLst>
+          </p:cNvPr>
+          <p:cNvSpPr txBox="1"/>
+          <p:nvPr/>
+        </p:nvSpPr>
+        <p:spPr>
+          <a:xfrm>
+            <a:off x="1304359" y="4714147"/>
+            <a:ext cx="2300630" cy="400110"/>
+          </a:xfrm>
+          <a:prstGeom prst="rect">
+            <a:avLst/>
+          </a:prstGeom>
+          <a:noFill/>
+        </p:spPr>
+        <p:txBody>
+          <a:bodyPr wrap="none" rtlCol="0">
+            <a:spAutoFit/>
+          </a:bodyPr>
+          <a:lstStyle/>
+          <a:p>
+            <a:r>
+              <a:rPr lang="en-US" dirty="0">
+                <a:latin typeface="Consolas" panose="020B0609020204030204" pitchFamily="49" charset="0"/>
+                <a:cs typeface="Consolas" panose="020B0609020204030204" pitchFamily="49" charset="0"/>
+              </a:rPr>
+              <a:t>[1, 2, 3, 5, 8]</a:t>
+            </a:r>
+          </a:p>
+        </p:txBody>
+      </p:sp>
+    </p:spTree>
+    <p:extLst>
+      <p:ext uri="{BB962C8B-B14F-4D97-AF65-F5344CB8AC3E}">
+        <p14:creationId xmlns:p14="http://schemas.microsoft.com/office/powerpoint/2010/main" val="1979774323"/>
+      </p:ext>
+    </p:extLst>
+  </p:cSld>
+  <p:clrMapOvr>
+    <a:masterClrMapping/>
+  </p:clrMapOvr>
+  <mc:AlternateContent xmlns:mc="http://schemas.openxmlformats.org/markup-compatibility/2006" xmlns:p14="http://schemas.microsoft.com/office/powerpoint/2010/main">
+    <mc:Choice Requires="p14">
+      <p:transition p14:dur="300">
+        <p:fade/>
+      </p:transition>
+    </mc:Choice>
+    <mc:Fallback xmlns="">
+      <p:transition>
+        <p:fade/>
+      </p:transition>
+    </mc:Fallback>
+  </mc:AlternateContent>
+  <p:timing>
+    <p:tnLst>
+      <p:par>
+        <p:cTn id="1" dur="indefinite" restart="never" nodeType="tmRoot">
+          <p:childTnLst>
+            <p:seq concurrent="1" nextAc="seek">
+              <p:cTn id="2" dur="indefinite" nodeType="mainSeq">
+                <p:childTnLst>
+                  <p:par>
+                    <p:cTn id="3" fill="hold">
+                      <p:stCondLst>
+                        <p:cond delay="indefinite"/>
+                      </p:stCondLst>
+                      <p:childTnLst>
+                        <p:par>
+                          <p:cTn id="4" fill="hold">
+                            <p:stCondLst>
+                              <p:cond delay="0"/>
+                            </p:stCondLst>
+                            <p:childTnLst>
+                              <p:par>
+                                <p:cTn id="5" presetID="9" presetClass="entr" presetSubtype="0" fill="hold" grpId="0" nodeType="clickEffect">
+                                  <p:stCondLst>
+                                    <p:cond delay="0"/>
+                                  </p:stCondLst>
+                                  <p:childTnLst>
+                                    <p:set>
+                                      <p:cBhvr>
+                                        <p:cTn id="6" dur="1" fill="hold">
+                                          <p:stCondLst>
+                                            <p:cond delay="0"/>
+                                          </p:stCondLst>
+                                        </p:cTn>
+                                        <p:tgtEl>
+                                          <p:spTgt spid="5"/>
+                                        </p:tgtEl>
+                                        <p:attrNameLst>
+                                          <p:attrName>style.visibility</p:attrName>
+                                        </p:attrNameLst>
+                                      </p:cBhvr>
+                                      <p:to>
+                                        <p:strVal val="visible"/>
+                                      </p:to>
+                                    </p:set>
+                                    <p:animEffect transition="in" filter="dissolve">
+                                      <p:cBhvr>
+                                        <p:cTn id="7" dur="500"/>
+                                        <p:tgtEl>
+                                          <p:spTgt spid="5"/>
+                                        </p:tgtEl>
+                                      </p:cBhvr>
+                                    </p:animEffect>
+                                  </p:childTnLst>
+                                </p:cTn>
+                              </p:par>
+                            </p:childTnLst>
+                          </p:cTn>
+                        </p:par>
+                      </p:childTnLst>
+                    </p:cTn>
+                  </p:par>
+                  <p:par>
+                    <p:cTn id="8" fill="hold">
+                      <p:stCondLst>
+                        <p:cond delay="indefinite"/>
+                      </p:stCondLst>
+                      <p:childTnLst>
+                        <p:par>
+                          <p:cTn id="9" fill="hold">
+                            <p:stCondLst>
+                              <p:cond delay="0"/>
+                            </p:stCondLst>
+                            <p:childTnLst>
+                              <p:par>
+                                <p:cTn id="10" presetID="9" presetClass="entr" presetSubtype="0" fill="hold" grpId="0" nodeType="clickEffect">
+                                  <p:stCondLst>
+                                    <p:cond delay="0"/>
+                                  </p:stCondLst>
+                                  <p:childTnLst>
+                                    <p:set>
+                                      <p:cBhvr>
+                                        <p:cTn id="11" dur="1" fill="hold">
+                                          <p:stCondLst>
+                                            <p:cond delay="0"/>
+                                          </p:stCondLst>
+                                        </p:cTn>
+                                        <p:tgtEl>
+                                          <p:spTgt spid="6"/>
+                                        </p:tgtEl>
+                                        <p:attrNameLst>
+                                          <p:attrName>style.visibility</p:attrName>
+                                        </p:attrNameLst>
+                                      </p:cBhvr>
+                                      <p:to>
+                                        <p:strVal val="visible"/>
+                                      </p:to>
+                                    </p:set>
+                                    <p:animEffect transition="in" filter="dissolve">
+                                      <p:cBhvr>
+                                        <p:cTn id="12" dur="500"/>
+                                        <p:tgtEl>
+                                          <p:spTgt spid="6"/>
+                                        </p:tgtEl>
+                                      </p:cBhvr>
+                                    </p:animEffect>
+                                  </p:childTnLst>
+                                </p:cTn>
+                              </p:par>
+                            </p:childTnLst>
+                          </p:cTn>
+                        </p:par>
+                      </p:childTnLst>
+                    </p:cTn>
+                  </p:par>
+                  <p:par>
+                    <p:cTn id="13" fill="hold">
+                      <p:stCondLst>
+                        <p:cond delay="indefinite"/>
+                      </p:stCondLst>
+                      <p:childTnLst>
+                        <p:par>
+                          <p:cTn id="14" fill="hold">
+                            <p:stCondLst>
+                              <p:cond delay="0"/>
+                            </p:stCondLst>
+                            <p:childTnLst>
+                              <p:par>
+                                <p:cTn id="15" presetID="9" presetClass="entr" presetSubtype="0" fill="hold" grpId="0" nodeType="clickEffect">
+                                  <p:stCondLst>
+                                    <p:cond delay="0"/>
+                                  </p:stCondLst>
+                                  <p:childTnLst>
+                                    <p:set>
+                                      <p:cBhvr>
+                                        <p:cTn id="16" dur="1" fill="hold">
+                                          <p:stCondLst>
+                                            <p:cond delay="0"/>
+                                          </p:stCondLst>
+                                        </p:cTn>
+                                        <p:tgtEl>
+                                          <p:spTgt spid="7"/>
+                                        </p:tgtEl>
+                                        <p:attrNameLst>
+                                          <p:attrName>style.visibility</p:attrName>
+                                        </p:attrNameLst>
+                                      </p:cBhvr>
+                                      <p:to>
+                                        <p:strVal val="visible"/>
+                                      </p:to>
+                                    </p:set>
+                                    <p:animEffect transition="in" filter="dissolve">
+                                      <p:cBhvr>
+                                        <p:cTn id="17" dur="500"/>
+                                        <p:tgtEl>
+                                          <p:spTgt spid="7"/>
+                                        </p:tgtEl>
+                                      </p:cBhvr>
+                                    </p:animEffect>
+                                  </p:childTnLst>
+                                </p:cTn>
+                              </p:par>
+                            </p:childTnLst>
+                          </p:cTn>
+                        </p:par>
+                      </p:childTnLst>
+                    </p:cTn>
+                  </p:par>
+                  <p:par>
+                    <p:cTn id="18" fill="hold">
+                      <p:stCondLst>
+                        <p:cond delay="indefinite"/>
+                      </p:stCondLst>
+                      <p:childTnLst>
+                        <p:par>
+                          <p:cTn id="19" fill="hold">
+                            <p:stCondLst>
+                              <p:cond delay="0"/>
+                            </p:stCondLst>
+                            <p:childTnLst>
+                              <p:par>
+                                <p:cTn id="20" presetID="9" presetClass="entr" presetSubtype="0" fill="hold" grpId="0" nodeType="clickEffect">
+                                  <p:stCondLst>
+                                    <p:cond delay="0"/>
+                                  </p:stCondLst>
+                                  <p:childTnLst>
+                                    <p:set>
+                                      <p:cBhvr>
+                                        <p:cTn id="21" dur="1" fill="hold">
+                                          <p:stCondLst>
+                                            <p:cond delay="0"/>
+                                          </p:stCondLst>
+                                        </p:cTn>
+                                        <p:tgtEl>
+                                          <p:spTgt spid="8"/>
+                                        </p:tgtEl>
+                                        <p:attrNameLst>
+                                          <p:attrName>style.visibility</p:attrName>
+                                        </p:attrNameLst>
+                                      </p:cBhvr>
+                                      <p:to>
+                                        <p:strVal val="visible"/>
+                                      </p:to>
+                                    </p:set>
+                                    <p:animEffect transition="in" filter="dissolve">
+                                      <p:cBhvr>
+                                        <p:cTn id="22" dur="500"/>
+                                        <p:tgtEl>
+                                          <p:spTgt spid="8"/>
+                                        </p:tgtEl>
+                                      </p:cBhvr>
+                                    </p:animEffect>
+                                  </p:childTnLst>
+                                </p:cTn>
+                              </p:par>
+                            </p:childTnLst>
+                          </p:cTn>
+                        </p:par>
+                      </p:childTnLst>
+                    </p:cTn>
+                  </p:par>
+                </p:childTnLst>
+              </p:cTn>
+              <p:prevCondLst>
+                <p:cond evt="onPrev" delay="0">
+                  <p:tgtEl>
+                    <p:sldTgt/>
+                  </p:tgtEl>
+                </p:cond>
+              </p:prevCondLst>
+              <p:nextCondLst>
+                <p:cond evt="onNext" delay="0">
+                  <p:tgtEl>
+                    <p:sldTgt/>
+                  </p:tgtEl>
+                </p:cond>
+              </p:nextCondLst>
+            </p:seq>
+          </p:childTnLst>
+        </p:cTn>
+      </p:par>
+    </p:tnLst>
+    <p:bldLst>
+      <p:bldP spid="5" grpId="0"/>
+      <p:bldP spid="6" grpId="0"/>
+      <p:bldP spid="7" grpId="0"/>
+      <p:bldP spid="8" grpId="0"/>
+    </p:bldLst>
+  </p:timing>
+</p:sld>
+</file>
+
+<file path=ppt/slides/slide7.xml><?xml version="1.0" encoding="utf-8"?>
+<p:sld xmlns:a="http://schemas.openxmlformats.org/drawingml/2006/main" xmlns:r="http://schemas.openxmlformats.org/officeDocument/2006/relationships" xmlns:p="http://schemas.openxmlformats.org/presentationml/2006/main">
+  <p:cSld>
+    <p:spTree>
+      <p:nvGrpSpPr>
+        <p:cNvPr id="1" name=""/>
+        <p:cNvGrpSpPr/>
+        <p:nvPr/>
+      </p:nvGrpSpPr>
+      <p:grpSpPr>
+        <a:xfrm>
+          <a:off x="0" y="0"/>
+          <a:ext cx="0" cy="0"/>
+          <a:chOff x="0" y="0"/>
+          <a:chExt cx="0" cy="0"/>
+        </a:xfrm>
+      </p:grpSpPr>
+      <p:sp>
+        <p:nvSpPr>
+          <p:cNvPr id="2" name="Title 1">
+            <a:extLst>
+              <a:ext uri="{FF2B5EF4-FFF2-40B4-BE49-F238E27FC236}">
                 <a16:creationId xmlns:a16="http://schemas.microsoft.com/office/drawing/2014/main" id="{9134D3DE-9E05-8342-993B-72CB3CA586F1}"/>
               </a:ext>
             </a:extLst>
@@ -18162,7 +20330,7 @@
 </p:sld>
 </file>
 
-<file path=ppt/slides/slide7.xml><?xml version="1.0" encoding="utf-8"?>
+<file path=ppt/slides/slide8.xml><?xml version="1.0" encoding="utf-8"?>
 <p:sld xmlns:a="http://schemas.openxmlformats.org/drawingml/2006/main" xmlns:r="http://schemas.openxmlformats.org/officeDocument/2006/relationships" xmlns:p="http://schemas.openxmlformats.org/presentationml/2006/main">
   <p:cSld>
     <p:spTree>
@@ -18362,7 +20530,7 @@
 </p:sld>
 </file>
 
-<file path=ppt/slides/slide8.xml><?xml version="1.0" encoding="utf-8"?>
+<file path=ppt/slides/slide9.xml><?xml version="1.0" encoding="utf-8"?>
 <p:sld xmlns:a="http://schemas.openxmlformats.org/drawingml/2006/main" xmlns:r="http://schemas.openxmlformats.org/officeDocument/2006/relationships" xmlns:p="http://schemas.openxmlformats.org/presentationml/2006/main">
   <p:cSld>
     <p:spTree>
@@ -19284,1611 +21452,6 @@
     <p:extLst>
       <p:ext uri="{BB962C8B-B14F-4D97-AF65-F5344CB8AC3E}">
         <p14:creationId xmlns:p14="http://schemas.microsoft.com/office/powerpoint/2010/main" val="2436844951"/>
-      </p:ext>
-    </p:extLst>
-  </p:cSld>
-  <p:clrMapOvr>
-    <a:masterClrMapping/>
-  </p:clrMapOvr>
-  <mc:AlternateContent xmlns:mc="http://schemas.openxmlformats.org/markup-compatibility/2006" xmlns:p14="http://schemas.microsoft.com/office/powerpoint/2010/main">
-    <mc:Choice Requires="p14">
-      <p:transition p14:dur="300">
-        <p:fade/>
-      </p:transition>
-    </mc:Choice>
-    <mc:Fallback xmlns="">
-      <p:transition>
-        <p:fade/>
-      </p:transition>
-    </mc:Fallback>
-  </mc:AlternateContent>
-</p:sld>
-</file>
-
-<file path=ppt/slides/slide9.xml><?xml version="1.0" encoding="utf-8"?>
-<p:sld xmlns:a="http://schemas.openxmlformats.org/drawingml/2006/main" xmlns:r="http://schemas.openxmlformats.org/officeDocument/2006/relationships" xmlns:p="http://schemas.openxmlformats.org/presentationml/2006/main">
-  <p:cSld>
-    <p:spTree>
-      <p:nvGrpSpPr>
-        <p:cNvPr id="1" name=""/>
-        <p:cNvGrpSpPr/>
-        <p:nvPr/>
-      </p:nvGrpSpPr>
-      <p:grpSpPr>
-        <a:xfrm>
-          <a:off x="0" y="0"/>
-          <a:ext cx="0" cy="0"/>
-          <a:chOff x="0" y="0"/>
-          <a:chExt cx="0" cy="0"/>
-        </a:xfrm>
-      </p:grpSpPr>
-      <p:sp>
-        <p:nvSpPr>
-          <p:cNvPr id="2" name="Title 1">
-            <a:extLst>
-              <a:ext uri="{FF2B5EF4-FFF2-40B4-BE49-F238E27FC236}">
-                <a16:creationId xmlns:a16="http://schemas.microsoft.com/office/drawing/2014/main" id="{0A758FF7-8D14-DF4E-A32F-9B533CE1BFA8}"/>
-              </a:ext>
-            </a:extLst>
-          </p:cNvPr>
-          <p:cNvSpPr>
-            <a:spLocks noGrp="1"/>
-          </p:cNvSpPr>
-          <p:nvPr>
-            <p:ph type="title"/>
-          </p:nvPr>
-        </p:nvSpPr>
-        <p:spPr/>
-        <p:txBody>
-          <a:bodyPr/>
-          <a:lstStyle/>
-          <a:p>
-            <a:r>
-              <a:rPr lang="en-US" dirty="0"/>
-              <a:t>Country</a:t>
-            </a:r>
-          </a:p>
-        </p:txBody>
-      </p:sp>
-      <p:sp>
-        <p:nvSpPr>
-          <p:cNvPr id="6" name="Rectangle 1">
-            <a:extLst>
-              <a:ext uri="{FF2B5EF4-FFF2-40B4-BE49-F238E27FC236}">
-                <a16:creationId xmlns:a16="http://schemas.microsoft.com/office/drawing/2014/main" id="{8ED0C47D-BC17-44BF-B794-1EBF50A776A9}"/>
-              </a:ext>
-            </a:extLst>
-          </p:cNvPr>
-          <p:cNvSpPr>
-            <a:spLocks noChangeArrowheads="1"/>
-          </p:cNvSpPr>
-          <p:nvPr/>
-        </p:nvSpPr>
-        <p:spPr bwMode="auto">
-          <a:xfrm>
-            <a:off x="3880884" y="422081"/>
-            <a:ext cx="7464056" cy="6740307"/>
-          </a:xfrm>
-          <a:prstGeom prst="rect">
-            <a:avLst/>
-          </a:prstGeom>
-          <a:solidFill>
-            <a:srgbClr val="2B2B2B"/>
-          </a:solidFill>
-          <a:ln>
-            <a:noFill/>
-          </a:ln>
-          <a:effectLst/>
-          <a:extLst>
-            <a:ext uri="{91240B29-F687-4F45-9708-019B960494DF}">
-              <a14:hiddenLine xmlns:a14="http://schemas.microsoft.com/office/drawing/2010/main" w="9525">
-                <a:solidFill>
-                  <a:schemeClr val="tx1"/>
-                </a:solidFill>
-                <a:miter lim="800000"/>
-                <a:headEnd/>
-                <a:tailEnd/>
-              </a14:hiddenLine>
-            </a:ext>
-            <a:ext uri="{AF507438-7753-43E0-B8FC-AC1667EBCBE1}">
-              <a14:hiddenEffects xmlns:a14="http://schemas.microsoft.com/office/drawing/2010/main">
-                <a:effectLst>
-                  <a:outerShdw dist="35921" dir="2700000" algn="ctr" rotWithShape="0">
-                    <a:schemeClr val="bg2"/>
-                  </a:outerShdw>
-                </a:effectLst>
-              </a14:hiddenEffects>
-            </a:ext>
-          </a:extLst>
-        </p:spPr>
-        <p:txBody>
-          <a:bodyPr vert="horz" wrap="square" lIns="91440" tIns="45720" rIns="91440" bIns="45720" numCol="1" anchor="ctr" anchorCtr="0" compatLnSpc="1">
-            <a:prstTxWarp prst="textNoShape">
-              <a:avLst/>
-            </a:prstTxWarp>
-            <a:spAutoFit/>
-          </a:bodyPr>
-          <a:lstStyle/>
-          <a:p>
-            <a:pPr marL="0" marR="0" lvl="0" indent="0" algn="l" defTabSz="914400" rtl="0" eaLnBrk="0" fontAlgn="base" latinLnBrk="0" hangingPunct="0">
-              <a:lnSpc>
-                <a:spcPct val="100000"/>
-              </a:lnSpc>
-              <a:spcBef>
-                <a:spcPct val="0"/>
-              </a:spcBef>
-              <a:spcAft>
-                <a:spcPct val="0"/>
-              </a:spcAft>
-              <a:buClrTx/>
-              <a:buSzTx/>
-              <a:buFontTx/>
-              <a:buNone/>
-              <a:tabLst/>
-            </a:pPr>
-            <a:r>
-              <a:rPr kumimoji="0" lang="en-US" altLang="en-US" sz="1800" b="0" i="0" u="none" strike="noStrike" cap="none" normalizeH="0" baseline="0">
-                <a:ln>
-                  <a:noFill/>
-                </a:ln>
-                <a:solidFill>
-                  <a:srgbClr val="CC7832"/>
-                </a:solidFill>
-                <a:effectLst/>
-                <a:latin typeface="JetBrains Mono"/>
-              </a:rPr>
-              <a:t>public class </a:t>
-            </a:r>
-            <a:r>
-              <a:rPr kumimoji="0" lang="en-US" altLang="en-US" sz="1800" b="0" i="0" u="none" strike="noStrike" cap="none" normalizeH="0" baseline="0">
-                <a:ln>
-                  <a:noFill/>
-                </a:ln>
-                <a:solidFill>
-                  <a:srgbClr val="A9B7C6"/>
-                </a:solidFill>
-                <a:effectLst/>
-                <a:latin typeface="JetBrains Mono"/>
-              </a:rPr>
-              <a:t>Country </a:t>
-            </a:r>
-            <a:r>
-              <a:rPr kumimoji="0" lang="en-US" altLang="en-US" sz="1800" b="0" i="0" u="none" strike="noStrike" cap="none" normalizeH="0" baseline="0">
-                <a:ln>
-                  <a:noFill/>
-                </a:ln>
-                <a:solidFill>
-                  <a:srgbClr val="CC7832"/>
-                </a:solidFill>
-                <a:effectLst/>
-                <a:latin typeface="JetBrains Mono"/>
-              </a:rPr>
-              <a:t>implements </a:t>
-            </a:r>
-            <a:r>
-              <a:rPr kumimoji="0" lang="en-US" altLang="en-US" sz="1800" b="0" i="0" u="none" strike="noStrike" cap="none" normalizeH="0" baseline="0">
-                <a:ln>
-                  <a:noFill/>
-                </a:ln>
-                <a:solidFill>
-                  <a:srgbClr val="A9B7C6"/>
-                </a:solidFill>
-                <a:effectLst/>
-                <a:latin typeface="JetBrains Mono"/>
-              </a:rPr>
-              <a:t>Comparable&lt;Country&gt;{</a:t>
-            </a:r>
-            <a:br>
-              <a:rPr kumimoji="0" lang="en-US" altLang="en-US" sz="1800" b="0" i="0" u="none" strike="noStrike" cap="none" normalizeH="0" baseline="0">
-                <a:ln>
-                  <a:noFill/>
-                </a:ln>
-                <a:solidFill>
-                  <a:srgbClr val="A9B7C6"/>
-                </a:solidFill>
-                <a:effectLst/>
-                <a:latin typeface="JetBrains Mono"/>
-              </a:rPr>
-            </a:br>
-            <a:r>
-              <a:rPr kumimoji="0" lang="en-US" altLang="en-US" sz="1800" b="0" i="0" u="none" strike="noStrike" cap="none" normalizeH="0" baseline="0">
-                <a:ln>
-                  <a:noFill/>
-                </a:ln>
-                <a:solidFill>
-                  <a:srgbClr val="A9B7C6"/>
-                </a:solidFill>
-                <a:effectLst/>
-                <a:latin typeface="JetBrains Mono"/>
-              </a:rPr>
-              <a:t>    </a:t>
-            </a:r>
-            <a:r>
-              <a:rPr kumimoji="0" lang="en-US" altLang="en-US" sz="1800" b="0" i="0" u="none" strike="noStrike" cap="none" normalizeH="0" baseline="0">
-                <a:ln>
-                  <a:noFill/>
-                </a:ln>
-                <a:solidFill>
-                  <a:srgbClr val="CC7832"/>
-                </a:solidFill>
-                <a:effectLst/>
-                <a:latin typeface="JetBrains Mono"/>
-              </a:rPr>
-              <a:t>private </a:t>
-            </a:r>
-            <a:r>
-              <a:rPr kumimoji="0" lang="en-US" altLang="en-US" sz="1800" b="0" i="0" u="none" strike="noStrike" cap="none" normalizeH="0" baseline="0">
-                <a:ln>
-                  <a:noFill/>
-                </a:ln>
-                <a:solidFill>
-                  <a:srgbClr val="A9B7C6"/>
-                </a:solidFill>
-                <a:effectLst/>
-                <a:latin typeface="JetBrains Mono"/>
-              </a:rPr>
-              <a:t>String </a:t>
-            </a:r>
-            <a:r>
-              <a:rPr kumimoji="0" lang="en-US" altLang="en-US" sz="1800" b="0" i="0" u="none" strike="noStrike" cap="none" normalizeH="0" baseline="0">
-                <a:ln>
-                  <a:noFill/>
-                </a:ln>
-                <a:solidFill>
-                  <a:srgbClr val="9876AA"/>
-                </a:solidFill>
-                <a:effectLst/>
-                <a:latin typeface="JetBrains Mono"/>
-              </a:rPr>
-              <a:t>name</a:t>
-            </a:r>
-            <a:r>
-              <a:rPr kumimoji="0" lang="en-US" altLang="en-US" sz="1800" b="0" i="0" u="none" strike="noStrike" cap="none" normalizeH="0" baseline="0">
-                <a:ln>
-                  <a:noFill/>
-                </a:ln>
-                <a:solidFill>
-                  <a:srgbClr val="CC7832"/>
-                </a:solidFill>
-                <a:effectLst/>
-                <a:latin typeface="JetBrains Mono"/>
-              </a:rPr>
-              <a:t>;</a:t>
-            </a:r>
-            <a:br>
-              <a:rPr kumimoji="0" lang="en-US" altLang="en-US" sz="1800" b="0" i="0" u="none" strike="noStrike" cap="none" normalizeH="0" baseline="0">
-                <a:ln>
-                  <a:noFill/>
-                </a:ln>
-                <a:solidFill>
-                  <a:srgbClr val="CC7832"/>
-                </a:solidFill>
-                <a:effectLst/>
-                <a:latin typeface="JetBrains Mono"/>
-              </a:rPr>
-            </a:br>
-            <a:r>
-              <a:rPr kumimoji="0" lang="en-US" altLang="en-US" sz="1800" b="0" i="0" u="none" strike="noStrike" cap="none" normalizeH="0" baseline="0">
-                <a:ln>
-                  <a:noFill/>
-                </a:ln>
-                <a:solidFill>
-                  <a:srgbClr val="CC7832"/>
-                </a:solidFill>
-                <a:effectLst/>
-                <a:latin typeface="JetBrains Mono"/>
-              </a:rPr>
-              <a:t>    private double </a:t>
-            </a:r>
-            <a:r>
-              <a:rPr kumimoji="0" lang="en-US" altLang="en-US" sz="1800" b="0" i="0" u="none" strike="noStrike" cap="none" normalizeH="0" baseline="0">
-                <a:ln>
-                  <a:noFill/>
-                </a:ln>
-                <a:solidFill>
-                  <a:srgbClr val="9876AA"/>
-                </a:solidFill>
-                <a:effectLst/>
-                <a:latin typeface="JetBrains Mono"/>
-              </a:rPr>
-              <a:t>area</a:t>
-            </a:r>
-            <a:r>
-              <a:rPr kumimoji="0" lang="en-US" altLang="en-US" sz="1800" b="0" i="0" u="none" strike="noStrike" cap="none" normalizeH="0" baseline="0">
-                <a:ln>
-                  <a:noFill/>
-                </a:ln>
-                <a:solidFill>
-                  <a:srgbClr val="CC7832"/>
-                </a:solidFill>
-                <a:effectLst/>
-                <a:latin typeface="JetBrains Mono"/>
-              </a:rPr>
-              <a:t>;</a:t>
-            </a:r>
-            <a:br>
-              <a:rPr kumimoji="0" lang="en-US" altLang="en-US" sz="1800" b="0" i="0" u="none" strike="noStrike" cap="none" normalizeH="0" baseline="0">
-                <a:ln>
-                  <a:noFill/>
-                </a:ln>
-                <a:solidFill>
-                  <a:srgbClr val="CC7832"/>
-                </a:solidFill>
-                <a:effectLst/>
-                <a:latin typeface="JetBrains Mono"/>
-              </a:rPr>
-            </a:br>
-            <a:r>
-              <a:rPr kumimoji="0" lang="en-US" altLang="en-US" sz="1800" b="0" i="0" u="none" strike="noStrike" cap="none" normalizeH="0" baseline="0">
-                <a:ln>
-                  <a:noFill/>
-                </a:ln>
-                <a:solidFill>
-                  <a:srgbClr val="CC7832"/>
-                </a:solidFill>
-                <a:effectLst/>
-                <a:latin typeface="JetBrains Mono"/>
-              </a:rPr>
-              <a:t>    static boolean </a:t>
-            </a:r>
-            <a:r>
-              <a:rPr kumimoji="0" lang="en-US" altLang="en-US" sz="1800" b="0" i="1" u="none" strike="noStrike" cap="none" normalizeH="0" baseline="0">
-                <a:ln>
-                  <a:noFill/>
-                </a:ln>
-                <a:solidFill>
-                  <a:srgbClr val="9876AA"/>
-                </a:solidFill>
-                <a:effectLst/>
-                <a:latin typeface="JetBrains Mono"/>
-              </a:rPr>
-              <a:t>compareData</a:t>
-            </a:r>
-            <a:r>
-              <a:rPr kumimoji="0" lang="en-US" altLang="en-US" sz="1800" b="0" i="0" u="none" strike="noStrike" cap="none" normalizeH="0" baseline="0">
-                <a:ln>
-                  <a:noFill/>
-                </a:ln>
-                <a:solidFill>
-                  <a:srgbClr val="CC7832"/>
-                </a:solidFill>
-                <a:effectLst/>
-                <a:latin typeface="JetBrains Mono"/>
-              </a:rPr>
-              <a:t>;</a:t>
-            </a:r>
-            <a:br>
-              <a:rPr kumimoji="0" lang="en-US" altLang="en-US" sz="1800" b="0" i="0" u="none" strike="noStrike" cap="none" normalizeH="0" baseline="0">
-                <a:ln>
-                  <a:noFill/>
-                </a:ln>
-                <a:solidFill>
-                  <a:srgbClr val="CC7832"/>
-                </a:solidFill>
-                <a:effectLst/>
-                <a:latin typeface="JetBrains Mono"/>
-              </a:rPr>
-            </a:br>
-            <a:r>
-              <a:rPr kumimoji="0" lang="en-US" altLang="en-US" sz="1800" b="0" i="0" u="none" strike="noStrike" cap="none" normalizeH="0" baseline="0">
-                <a:ln>
-                  <a:noFill/>
-                </a:ln>
-                <a:solidFill>
-                  <a:srgbClr val="CC7832"/>
-                </a:solidFill>
-                <a:effectLst/>
-                <a:latin typeface="JetBrains Mono"/>
-              </a:rPr>
-              <a:t>    public </a:t>
-            </a:r>
-            <a:r>
-              <a:rPr kumimoji="0" lang="en-US" altLang="en-US" sz="1800" b="0" i="0" u="none" strike="noStrike" cap="none" normalizeH="0" baseline="0">
-                <a:ln>
-                  <a:noFill/>
-                </a:ln>
-                <a:solidFill>
-                  <a:srgbClr val="FFC66D"/>
-                </a:solidFill>
-                <a:effectLst/>
-                <a:latin typeface="JetBrains Mono"/>
-              </a:rPr>
-              <a:t>Country</a:t>
-            </a:r>
-            <a:r>
-              <a:rPr kumimoji="0" lang="en-US" altLang="en-US" sz="1800" b="0" i="0" u="none" strike="noStrike" cap="none" normalizeH="0" baseline="0">
-                <a:ln>
-                  <a:noFill/>
-                </a:ln>
-                <a:solidFill>
-                  <a:srgbClr val="A9B7C6"/>
-                </a:solidFill>
-                <a:effectLst/>
-                <a:latin typeface="JetBrains Mono"/>
-              </a:rPr>
-              <a:t>(String name</a:t>
-            </a:r>
-            <a:r>
-              <a:rPr kumimoji="0" lang="en-US" altLang="en-US" sz="1800" b="0" i="0" u="none" strike="noStrike" cap="none" normalizeH="0" baseline="0">
-                <a:ln>
-                  <a:noFill/>
-                </a:ln>
-                <a:solidFill>
-                  <a:srgbClr val="CC7832"/>
-                </a:solidFill>
-                <a:effectLst/>
-                <a:latin typeface="JetBrains Mono"/>
-              </a:rPr>
-              <a:t>, double </a:t>
-            </a:r>
-            <a:r>
-              <a:rPr kumimoji="0" lang="en-US" altLang="en-US" sz="1800" b="0" i="0" u="none" strike="noStrike" cap="none" normalizeH="0" baseline="0">
-                <a:ln>
-                  <a:noFill/>
-                </a:ln>
-                <a:solidFill>
-                  <a:srgbClr val="A9B7C6"/>
-                </a:solidFill>
-                <a:effectLst/>
-                <a:latin typeface="JetBrains Mono"/>
-              </a:rPr>
-              <a:t>area){</a:t>
-            </a:r>
-            <a:br>
-              <a:rPr kumimoji="0" lang="en-US" altLang="en-US" sz="1800" b="0" i="0" u="none" strike="noStrike" cap="none" normalizeH="0" baseline="0">
-                <a:ln>
-                  <a:noFill/>
-                </a:ln>
-                <a:solidFill>
-                  <a:srgbClr val="A9B7C6"/>
-                </a:solidFill>
-                <a:effectLst/>
-                <a:latin typeface="JetBrains Mono"/>
-              </a:rPr>
-            </a:br>
-            <a:r>
-              <a:rPr kumimoji="0" lang="en-US" altLang="en-US" sz="1800" b="0" i="0" u="none" strike="noStrike" cap="none" normalizeH="0" baseline="0">
-                <a:ln>
-                  <a:noFill/>
-                </a:ln>
-                <a:solidFill>
-                  <a:srgbClr val="A9B7C6"/>
-                </a:solidFill>
-                <a:effectLst/>
-                <a:latin typeface="JetBrains Mono"/>
-              </a:rPr>
-              <a:t>        </a:t>
-            </a:r>
-            <a:r>
-              <a:rPr kumimoji="0" lang="en-US" altLang="en-US" sz="1800" b="0" i="0" u="none" strike="noStrike" cap="none" normalizeH="0" baseline="0">
-                <a:ln>
-                  <a:noFill/>
-                </a:ln>
-                <a:solidFill>
-                  <a:srgbClr val="CC7832"/>
-                </a:solidFill>
-                <a:effectLst/>
-                <a:latin typeface="JetBrains Mono"/>
-              </a:rPr>
-              <a:t>this</a:t>
-            </a:r>
-            <a:r>
-              <a:rPr kumimoji="0" lang="en-US" altLang="en-US" sz="1800" b="0" i="0" u="none" strike="noStrike" cap="none" normalizeH="0" baseline="0">
-                <a:ln>
-                  <a:noFill/>
-                </a:ln>
-                <a:solidFill>
-                  <a:srgbClr val="A9B7C6"/>
-                </a:solidFill>
-                <a:effectLst/>
-                <a:latin typeface="JetBrains Mono"/>
-              </a:rPr>
-              <a:t>.</a:t>
-            </a:r>
-            <a:r>
-              <a:rPr kumimoji="0" lang="en-US" altLang="en-US" sz="1800" b="0" i="0" u="none" strike="noStrike" cap="none" normalizeH="0" baseline="0">
-                <a:ln>
-                  <a:noFill/>
-                </a:ln>
-                <a:solidFill>
-                  <a:srgbClr val="9876AA"/>
-                </a:solidFill>
-                <a:effectLst/>
-                <a:latin typeface="JetBrains Mono"/>
-              </a:rPr>
-              <a:t>name </a:t>
-            </a:r>
-            <a:r>
-              <a:rPr kumimoji="0" lang="en-US" altLang="en-US" sz="1800" b="0" i="0" u="none" strike="noStrike" cap="none" normalizeH="0" baseline="0">
-                <a:ln>
-                  <a:noFill/>
-                </a:ln>
-                <a:solidFill>
-                  <a:srgbClr val="A9B7C6"/>
-                </a:solidFill>
-                <a:effectLst/>
-                <a:latin typeface="JetBrains Mono"/>
-              </a:rPr>
-              <a:t>= name</a:t>
-            </a:r>
-            <a:r>
-              <a:rPr kumimoji="0" lang="en-US" altLang="en-US" sz="1800" b="0" i="0" u="none" strike="noStrike" cap="none" normalizeH="0" baseline="0">
-                <a:ln>
-                  <a:noFill/>
-                </a:ln>
-                <a:solidFill>
-                  <a:srgbClr val="CC7832"/>
-                </a:solidFill>
-                <a:effectLst/>
-                <a:latin typeface="JetBrains Mono"/>
-              </a:rPr>
-              <a:t>;</a:t>
-            </a:r>
-            <a:br>
-              <a:rPr kumimoji="0" lang="en-US" altLang="en-US" sz="1800" b="0" i="0" u="none" strike="noStrike" cap="none" normalizeH="0" baseline="0">
-                <a:ln>
-                  <a:noFill/>
-                </a:ln>
-                <a:solidFill>
-                  <a:srgbClr val="CC7832"/>
-                </a:solidFill>
-                <a:effectLst/>
-                <a:latin typeface="JetBrains Mono"/>
-              </a:rPr>
-            </a:br>
-            <a:r>
-              <a:rPr kumimoji="0" lang="en-US" altLang="en-US" sz="1800" b="0" i="0" u="none" strike="noStrike" cap="none" normalizeH="0" baseline="0">
-                <a:ln>
-                  <a:noFill/>
-                </a:ln>
-                <a:solidFill>
-                  <a:srgbClr val="CC7832"/>
-                </a:solidFill>
-                <a:effectLst/>
-                <a:latin typeface="JetBrains Mono"/>
-              </a:rPr>
-              <a:t>        this</a:t>
-            </a:r>
-            <a:r>
-              <a:rPr kumimoji="0" lang="en-US" altLang="en-US" sz="1800" b="0" i="0" u="none" strike="noStrike" cap="none" normalizeH="0" baseline="0">
-                <a:ln>
-                  <a:noFill/>
-                </a:ln>
-                <a:solidFill>
-                  <a:srgbClr val="A9B7C6"/>
-                </a:solidFill>
-                <a:effectLst/>
-                <a:latin typeface="JetBrains Mono"/>
-              </a:rPr>
-              <a:t>.</a:t>
-            </a:r>
-            <a:r>
-              <a:rPr kumimoji="0" lang="en-US" altLang="en-US" sz="1800" b="0" i="0" u="none" strike="noStrike" cap="none" normalizeH="0" baseline="0">
-                <a:ln>
-                  <a:noFill/>
-                </a:ln>
-                <a:solidFill>
-                  <a:srgbClr val="9876AA"/>
-                </a:solidFill>
-                <a:effectLst/>
-                <a:latin typeface="JetBrains Mono"/>
-              </a:rPr>
-              <a:t>area </a:t>
-            </a:r>
-            <a:r>
-              <a:rPr kumimoji="0" lang="en-US" altLang="en-US" sz="1800" b="0" i="0" u="none" strike="noStrike" cap="none" normalizeH="0" baseline="0">
-                <a:ln>
-                  <a:noFill/>
-                </a:ln>
-                <a:solidFill>
-                  <a:srgbClr val="A9B7C6"/>
-                </a:solidFill>
-                <a:effectLst/>
-                <a:latin typeface="JetBrains Mono"/>
-              </a:rPr>
-              <a:t>= area</a:t>
-            </a:r>
-            <a:r>
-              <a:rPr kumimoji="0" lang="en-US" altLang="en-US" sz="1800" b="0" i="0" u="none" strike="noStrike" cap="none" normalizeH="0" baseline="0">
-                <a:ln>
-                  <a:noFill/>
-                </a:ln>
-                <a:solidFill>
-                  <a:srgbClr val="CC7832"/>
-                </a:solidFill>
-                <a:effectLst/>
-                <a:latin typeface="JetBrains Mono"/>
-              </a:rPr>
-              <a:t>;</a:t>
-            </a:r>
-            <a:br>
-              <a:rPr kumimoji="0" lang="en-US" altLang="en-US" sz="1800" b="0" i="0" u="none" strike="noStrike" cap="none" normalizeH="0" baseline="0">
-                <a:ln>
-                  <a:noFill/>
-                </a:ln>
-                <a:solidFill>
-                  <a:srgbClr val="CC7832"/>
-                </a:solidFill>
-                <a:effectLst/>
-                <a:latin typeface="JetBrains Mono"/>
-              </a:rPr>
-            </a:br>
-            <a:r>
-              <a:rPr kumimoji="0" lang="en-US" altLang="en-US" sz="1800" b="0" i="0" u="none" strike="noStrike" cap="none" normalizeH="0" baseline="0">
-                <a:ln>
-                  <a:noFill/>
-                </a:ln>
-                <a:solidFill>
-                  <a:srgbClr val="CC7832"/>
-                </a:solidFill>
-                <a:effectLst/>
-                <a:latin typeface="JetBrains Mono"/>
-              </a:rPr>
-              <a:t>    </a:t>
-            </a:r>
-            <a:r>
-              <a:rPr kumimoji="0" lang="en-US" altLang="en-US" sz="1800" b="0" i="0" u="none" strike="noStrike" cap="none" normalizeH="0" baseline="0">
-                <a:ln>
-                  <a:noFill/>
-                </a:ln>
-                <a:solidFill>
-                  <a:srgbClr val="A9B7C6"/>
-                </a:solidFill>
-                <a:effectLst/>
-                <a:latin typeface="JetBrains Mono"/>
-              </a:rPr>
-              <a:t>}</a:t>
-            </a:r>
-            <a:br>
-              <a:rPr kumimoji="0" lang="en-US" altLang="en-US" sz="1800" b="0" i="0" u="none" strike="noStrike" cap="none" normalizeH="0" baseline="0">
-                <a:ln>
-                  <a:noFill/>
-                </a:ln>
-                <a:solidFill>
-                  <a:srgbClr val="A9B7C6"/>
-                </a:solidFill>
-                <a:effectLst/>
-                <a:latin typeface="JetBrains Mono"/>
-              </a:rPr>
-            </a:br>
-            <a:r>
-              <a:rPr kumimoji="0" lang="en-US" altLang="en-US" sz="1800" b="0" i="0" u="none" strike="noStrike" cap="none" normalizeH="0" baseline="0">
-                <a:ln>
-                  <a:noFill/>
-                </a:ln>
-                <a:solidFill>
-                  <a:srgbClr val="A9B7C6"/>
-                </a:solidFill>
-                <a:effectLst/>
-                <a:latin typeface="JetBrains Mono"/>
-              </a:rPr>
-              <a:t>    </a:t>
-            </a:r>
-            <a:r>
-              <a:rPr kumimoji="0" lang="en-US" altLang="en-US" sz="1800" b="0" i="0" u="none" strike="noStrike" cap="none" normalizeH="0" baseline="0">
-                <a:ln>
-                  <a:noFill/>
-                </a:ln>
-                <a:solidFill>
-                  <a:srgbClr val="CC7832"/>
-                </a:solidFill>
-                <a:effectLst/>
-                <a:latin typeface="JetBrains Mono"/>
-              </a:rPr>
-              <a:t>public double </a:t>
-            </a:r>
-            <a:r>
-              <a:rPr kumimoji="0" lang="en-US" altLang="en-US" sz="1800" b="0" i="0" u="none" strike="noStrike" cap="none" normalizeH="0" baseline="0">
-                <a:ln>
-                  <a:noFill/>
-                </a:ln>
-                <a:solidFill>
-                  <a:srgbClr val="FFC66D"/>
-                </a:solidFill>
-                <a:effectLst/>
-                <a:latin typeface="JetBrains Mono"/>
-              </a:rPr>
-              <a:t>getArea</a:t>
-            </a:r>
-            <a:r>
-              <a:rPr kumimoji="0" lang="en-US" altLang="en-US" sz="1800" b="0" i="0" u="none" strike="noStrike" cap="none" normalizeH="0" baseline="0">
-                <a:ln>
-                  <a:noFill/>
-                </a:ln>
-                <a:solidFill>
-                  <a:srgbClr val="A9B7C6"/>
-                </a:solidFill>
-                <a:effectLst/>
-                <a:latin typeface="JetBrains Mono"/>
-              </a:rPr>
-              <a:t>(){</a:t>
-            </a:r>
-            <a:br>
-              <a:rPr kumimoji="0" lang="en-US" altLang="en-US" sz="1800" b="0" i="0" u="none" strike="noStrike" cap="none" normalizeH="0" baseline="0">
-                <a:ln>
-                  <a:noFill/>
-                </a:ln>
-                <a:solidFill>
-                  <a:srgbClr val="A9B7C6"/>
-                </a:solidFill>
-                <a:effectLst/>
-                <a:latin typeface="JetBrains Mono"/>
-              </a:rPr>
-            </a:br>
-            <a:r>
-              <a:rPr kumimoji="0" lang="en-US" altLang="en-US" sz="1800" b="0" i="0" u="none" strike="noStrike" cap="none" normalizeH="0" baseline="0">
-                <a:ln>
-                  <a:noFill/>
-                </a:ln>
-                <a:solidFill>
-                  <a:srgbClr val="A9B7C6"/>
-                </a:solidFill>
-                <a:effectLst/>
-                <a:latin typeface="JetBrains Mono"/>
-              </a:rPr>
-              <a:t>        </a:t>
-            </a:r>
-            <a:r>
-              <a:rPr kumimoji="0" lang="en-US" altLang="en-US" sz="1800" b="0" i="0" u="none" strike="noStrike" cap="none" normalizeH="0" baseline="0">
-                <a:ln>
-                  <a:noFill/>
-                </a:ln>
-                <a:solidFill>
-                  <a:srgbClr val="CC7832"/>
-                </a:solidFill>
-                <a:effectLst/>
-                <a:latin typeface="JetBrains Mono"/>
-              </a:rPr>
-              <a:t>return </a:t>
-            </a:r>
-            <a:r>
-              <a:rPr kumimoji="0" lang="en-US" altLang="en-US" sz="1800" b="0" i="0" u="none" strike="noStrike" cap="none" normalizeH="0" baseline="0">
-                <a:ln>
-                  <a:noFill/>
-                </a:ln>
-                <a:solidFill>
-                  <a:srgbClr val="9876AA"/>
-                </a:solidFill>
-                <a:effectLst/>
-                <a:latin typeface="JetBrains Mono"/>
-              </a:rPr>
-              <a:t>area</a:t>
-            </a:r>
-            <a:r>
-              <a:rPr kumimoji="0" lang="en-US" altLang="en-US" sz="1800" b="0" i="0" u="none" strike="noStrike" cap="none" normalizeH="0" baseline="0">
-                <a:ln>
-                  <a:noFill/>
-                </a:ln>
-                <a:solidFill>
-                  <a:srgbClr val="CC7832"/>
-                </a:solidFill>
-                <a:effectLst/>
-                <a:latin typeface="JetBrains Mono"/>
-              </a:rPr>
-              <a:t>;</a:t>
-            </a:r>
-            <a:br>
-              <a:rPr kumimoji="0" lang="en-US" altLang="en-US" sz="1800" b="0" i="0" u="none" strike="noStrike" cap="none" normalizeH="0" baseline="0">
-                <a:ln>
-                  <a:noFill/>
-                </a:ln>
-                <a:solidFill>
-                  <a:srgbClr val="CC7832"/>
-                </a:solidFill>
-                <a:effectLst/>
-                <a:latin typeface="JetBrains Mono"/>
-              </a:rPr>
-            </a:br>
-            <a:r>
-              <a:rPr kumimoji="0" lang="en-US" altLang="en-US" sz="1800" b="0" i="0" u="none" strike="noStrike" cap="none" normalizeH="0" baseline="0">
-                <a:ln>
-                  <a:noFill/>
-                </a:ln>
-                <a:solidFill>
-                  <a:srgbClr val="CC7832"/>
-                </a:solidFill>
-                <a:effectLst/>
-                <a:latin typeface="JetBrains Mono"/>
-              </a:rPr>
-              <a:t>    </a:t>
-            </a:r>
-            <a:r>
-              <a:rPr kumimoji="0" lang="en-US" altLang="en-US" sz="1800" b="0" i="0" u="none" strike="noStrike" cap="none" normalizeH="0" baseline="0">
-                <a:ln>
-                  <a:noFill/>
-                </a:ln>
-                <a:solidFill>
-                  <a:srgbClr val="A9B7C6"/>
-                </a:solidFill>
-                <a:effectLst/>
-                <a:latin typeface="JetBrains Mono"/>
-              </a:rPr>
-              <a:t>}</a:t>
-            </a:r>
-            <a:br>
-              <a:rPr kumimoji="0" lang="en-US" altLang="en-US" sz="1800" b="0" i="0" u="none" strike="noStrike" cap="none" normalizeH="0" baseline="0">
-                <a:ln>
-                  <a:noFill/>
-                </a:ln>
-                <a:solidFill>
-                  <a:srgbClr val="A9B7C6"/>
-                </a:solidFill>
-                <a:effectLst/>
-                <a:latin typeface="JetBrains Mono"/>
-              </a:rPr>
-            </a:br>
-            <a:r>
-              <a:rPr kumimoji="0" lang="en-US" altLang="en-US" sz="1800" b="0" i="0" u="none" strike="noStrike" cap="none" normalizeH="0" baseline="0">
-                <a:ln>
-                  <a:noFill/>
-                </a:ln>
-                <a:solidFill>
-                  <a:srgbClr val="A9B7C6"/>
-                </a:solidFill>
-                <a:effectLst/>
-                <a:latin typeface="JetBrains Mono"/>
-              </a:rPr>
-              <a:t>    </a:t>
-            </a:r>
-            <a:r>
-              <a:rPr kumimoji="0" lang="en-US" altLang="en-US" sz="1800" b="0" i="0" u="none" strike="noStrike" cap="none" normalizeH="0" baseline="0">
-                <a:ln>
-                  <a:noFill/>
-                </a:ln>
-                <a:solidFill>
-                  <a:srgbClr val="CC7832"/>
-                </a:solidFill>
-                <a:effectLst/>
-                <a:latin typeface="JetBrains Mono"/>
-              </a:rPr>
-              <a:t>public </a:t>
-            </a:r>
-            <a:r>
-              <a:rPr kumimoji="0" lang="en-US" altLang="en-US" sz="1800" b="0" i="0" u="none" strike="noStrike" cap="none" normalizeH="0" baseline="0">
-                <a:ln>
-                  <a:noFill/>
-                </a:ln>
-                <a:solidFill>
-                  <a:srgbClr val="A9B7C6"/>
-                </a:solidFill>
-                <a:effectLst/>
-                <a:latin typeface="JetBrains Mono"/>
-              </a:rPr>
-              <a:t>String </a:t>
-            </a:r>
-            <a:r>
-              <a:rPr kumimoji="0" lang="en-US" altLang="en-US" sz="1800" b="0" i="0" u="none" strike="noStrike" cap="none" normalizeH="0" baseline="0">
-                <a:ln>
-                  <a:noFill/>
-                </a:ln>
-                <a:solidFill>
-                  <a:srgbClr val="FFC66D"/>
-                </a:solidFill>
-                <a:effectLst/>
-                <a:latin typeface="JetBrains Mono"/>
-              </a:rPr>
-              <a:t>getName</a:t>
-            </a:r>
-            <a:r>
-              <a:rPr kumimoji="0" lang="en-US" altLang="en-US" sz="1800" b="0" i="0" u="none" strike="noStrike" cap="none" normalizeH="0" baseline="0">
-                <a:ln>
-                  <a:noFill/>
-                </a:ln>
-                <a:solidFill>
-                  <a:srgbClr val="A9B7C6"/>
-                </a:solidFill>
-                <a:effectLst/>
-                <a:latin typeface="JetBrains Mono"/>
-              </a:rPr>
-              <a:t>(){ </a:t>
-            </a:r>
-            <a:r>
-              <a:rPr kumimoji="0" lang="en-US" altLang="en-US" sz="1800" b="0" i="0" u="none" strike="noStrike" cap="none" normalizeH="0" baseline="0">
-                <a:ln>
-                  <a:noFill/>
-                </a:ln>
-                <a:solidFill>
-                  <a:srgbClr val="CC7832"/>
-                </a:solidFill>
-                <a:effectLst/>
-                <a:latin typeface="JetBrains Mono"/>
-              </a:rPr>
-              <a:t>return </a:t>
-            </a:r>
-            <a:r>
-              <a:rPr kumimoji="0" lang="en-US" altLang="en-US" sz="1800" b="0" i="0" u="none" strike="noStrike" cap="none" normalizeH="0" baseline="0">
-                <a:ln>
-                  <a:noFill/>
-                </a:ln>
-                <a:solidFill>
-                  <a:srgbClr val="9876AA"/>
-                </a:solidFill>
-                <a:effectLst/>
-                <a:latin typeface="JetBrains Mono"/>
-              </a:rPr>
-              <a:t>name</a:t>
-            </a:r>
-            <a:r>
-              <a:rPr kumimoji="0" lang="en-US" altLang="en-US" sz="1800" b="0" i="0" u="none" strike="noStrike" cap="none" normalizeH="0" baseline="0">
-                <a:ln>
-                  <a:noFill/>
-                </a:ln>
-                <a:solidFill>
-                  <a:srgbClr val="CC7832"/>
-                </a:solidFill>
-                <a:effectLst/>
-                <a:latin typeface="JetBrains Mono"/>
-              </a:rPr>
-              <a:t>; </a:t>
-            </a:r>
-            <a:r>
-              <a:rPr kumimoji="0" lang="en-US" altLang="en-US" sz="1800" b="0" i="0" u="none" strike="noStrike" cap="none" normalizeH="0" baseline="0">
-                <a:ln>
-                  <a:noFill/>
-                </a:ln>
-                <a:solidFill>
-                  <a:srgbClr val="A9B7C6"/>
-                </a:solidFill>
-                <a:effectLst/>
-                <a:latin typeface="JetBrains Mono"/>
-              </a:rPr>
-              <a:t>}</a:t>
-            </a:r>
-            <a:br>
-              <a:rPr kumimoji="0" lang="en-US" altLang="en-US" sz="1800" b="0" i="0" u="none" strike="noStrike" cap="none" normalizeH="0" baseline="0">
-                <a:ln>
-                  <a:noFill/>
-                </a:ln>
-                <a:solidFill>
-                  <a:srgbClr val="A9B7C6"/>
-                </a:solidFill>
-                <a:effectLst/>
-                <a:latin typeface="JetBrains Mono"/>
-              </a:rPr>
-            </a:br>
-            <a:r>
-              <a:rPr kumimoji="0" lang="en-US" altLang="en-US" sz="1800" b="0" i="0" u="none" strike="noStrike" cap="none" normalizeH="0" baseline="0">
-                <a:ln>
-                  <a:noFill/>
-                </a:ln>
-                <a:solidFill>
-                  <a:srgbClr val="A9B7C6"/>
-                </a:solidFill>
-                <a:effectLst/>
-                <a:latin typeface="JetBrains Mono"/>
-              </a:rPr>
-              <a:t>    </a:t>
-            </a:r>
-            <a:r>
-              <a:rPr kumimoji="0" lang="en-US" altLang="en-US" sz="1800" b="0" i="0" u="none" strike="noStrike" cap="none" normalizeH="0" baseline="0">
-                <a:ln>
-                  <a:noFill/>
-                </a:ln>
-                <a:solidFill>
-                  <a:srgbClr val="BBB529"/>
-                </a:solidFill>
-                <a:effectLst/>
-                <a:latin typeface="JetBrains Mono"/>
-              </a:rPr>
-              <a:t>@Override</a:t>
-            </a:r>
-            <a:br>
-              <a:rPr kumimoji="0" lang="en-US" altLang="en-US" sz="1800" b="0" i="0" u="none" strike="noStrike" cap="none" normalizeH="0" baseline="0">
-                <a:ln>
-                  <a:noFill/>
-                </a:ln>
-                <a:solidFill>
-                  <a:srgbClr val="BBB529"/>
-                </a:solidFill>
-                <a:effectLst/>
-                <a:latin typeface="JetBrains Mono"/>
-              </a:rPr>
-            </a:br>
-            <a:r>
-              <a:rPr kumimoji="0" lang="en-US" altLang="en-US" sz="1800" b="0" i="0" u="none" strike="noStrike" cap="none" normalizeH="0" baseline="0">
-                <a:ln>
-                  <a:noFill/>
-                </a:ln>
-                <a:solidFill>
-                  <a:srgbClr val="BBB529"/>
-                </a:solidFill>
-                <a:effectLst/>
-                <a:latin typeface="JetBrains Mono"/>
-              </a:rPr>
-              <a:t>    </a:t>
-            </a:r>
-            <a:r>
-              <a:rPr kumimoji="0" lang="en-US" altLang="en-US" sz="1800" b="0" i="0" u="none" strike="noStrike" cap="none" normalizeH="0" baseline="0">
-                <a:ln>
-                  <a:noFill/>
-                </a:ln>
-                <a:solidFill>
-                  <a:srgbClr val="CC7832"/>
-                </a:solidFill>
-                <a:effectLst/>
-                <a:latin typeface="JetBrains Mono"/>
-              </a:rPr>
-              <a:t>public int </a:t>
-            </a:r>
-            <a:r>
-              <a:rPr kumimoji="0" lang="en-US" altLang="en-US" sz="1800" b="0" i="0" u="none" strike="noStrike" cap="none" normalizeH="0" baseline="0">
-                <a:ln>
-                  <a:noFill/>
-                </a:ln>
-                <a:solidFill>
-                  <a:srgbClr val="FFC66D"/>
-                </a:solidFill>
-                <a:effectLst/>
-                <a:latin typeface="JetBrains Mono"/>
-              </a:rPr>
-              <a:t>compareTo</a:t>
-            </a:r>
-            <a:r>
-              <a:rPr kumimoji="0" lang="en-US" altLang="en-US" sz="1800" b="0" i="0" u="none" strike="noStrike" cap="none" normalizeH="0" baseline="0">
-                <a:ln>
-                  <a:noFill/>
-                </a:ln>
-                <a:solidFill>
-                  <a:srgbClr val="A9B7C6"/>
-                </a:solidFill>
-                <a:effectLst/>
-                <a:latin typeface="JetBrains Mono"/>
-              </a:rPr>
-              <a:t>(Country o) {</a:t>
-            </a:r>
-            <a:br>
-              <a:rPr kumimoji="0" lang="en-US" altLang="en-US" sz="1800" b="0" i="0" u="none" strike="noStrike" cap="none" normalizeH="0" baseline="0">
-                <a:ln>
-                  <a:noFill/>
-                </a:ln>
-                <a:solidFill>
-                  <a:srgbClr val="A9B7C6"/>
-                </a:solidFill>
-                <a:effectLst/>
-                <a:latin typeface="JetBrains Mono"/>
-              </a:rPr>
-            </a:br>
-            <a:r>
-              <a:rPr kumimoji="0" lang="en-US" altLang="en-US" sz="1800" b="0" i="0" u="none" strike="noStrike" cap="none" normalizeH="0" baseline="0">
-                <a:ln>
-                  <a:noFill/>
-                </a:ln>
-                <a:solidFill>
-                  <a:srgbClr val="A9B7C6"/>
-                </a:solidFill>
-                <a:effectLst/>
-                <a:latin typeface="JetBrains Mono"/>
-              </a:rPr>
-              <a:t>        </a:t>
-            </a:r>
-            <a:r>
-              <a:rPr kumimoji="0" lang="en-US" altLang="en-US" sz="1800" b="0" i="0" u="none" strike="noStrike" cap="none" normalizeH="0" baseline="0">
-                <a:ln>
-                  <a:noFill/>
-                </a:ln>
-                <a:solidFill>
-                  <a:srgbClr val="808080"/>
-                </a:solidFill>
-                <a:effectLst/>
-                <a:latin typeface="JetBrains Mono"/>
-              </a:rPr>
-              <a:t>//needs to be implemented</a:t>
-            </a:r>
-            <a:br>
-              <a:rPr kumimoji="0" lang="en-US" altLang="en-US" sz="1800" b="0" i="0" u="none" strike="noStrike" cap="none" normalizeH="0" baseline="0">
-                <a:ln>
-                  <a:noFill/>
-                </a:ln>
-                <a:solidFill>
-                  <a:srgbClr val="808080"/>
-                </a:solidFill>
-                <a:effectLst/>
-                <a:latin typeface="JetBrains Mono"/>
-              </a:rPr>
-            </a:br>
-            <a:r>
-              <a:rPr kumimoji="0" lang="en-US" altLang="en-US" sz="1800" b="0" i="0" u="none" strike="noStrike" cap="none" normalizeH="0" baseline="0">
-                <a:ln>
-                  <a:noFill/>
-                </a:ln>
-                <a:solidFill>
-                  <a:srgbClr val="808080"/>
-                </a:solidFill>
-                <a:effectLst/>
-                <a:latin typeface="JetBrains Mono"/>
-              </a:rPr>
-              <a:t>    </a:t>
-            </a:r>
-            <a:r>
-              <a:rPr kumimoji="0" lang="en-US" altLang="en-US" sz="1800" b="0" i="0" u="none" strike="noStrike" cap="none" normalizeH="0" baseline="0">
-                <a:ln>
-                  <a:noFill/>
-                </a:ln>
-                <a:solidFill>
-                  <a:srgbClr val="A9B7C6"/>
-                </a:solidFill>
-                <a:effectLst/>
-                <a:latin typeface="JetBrains Mono"/>
-              </a:rPr>
-              <a:t>}</a:t>
-            </a:r>
-            <a:br>
-              <a:rPr kumimoji="0" lang="en-US" altLang="en-US" sz="1800" b="0" i="0" u="none" strike="noStrike" cap="none" normalizeH="0" baseline="0">
-                <a:ln>
-                  <a:noFill/>
-                </a:ln>
-                <a:solidFill>
-                  <a:srgbClr val="A9B7C6"/>
-                </a:solidFill>
-                <a:effectLst/>
-                <a:latin typeface="JetBrains Mono"/>
-              </a:rPr>
-            </a:br>
-            <a:r>
-              <a:rPr kumimoji="0" lang="en-US" altLang="en-US" sz="1800" b="0" i="0" u="none" strike="noStrike" cap="none" normalizeH="0" baseline="0">
-                <a:ln>
-                  <a:noFill/>
-                </a:ln>
-                <a:solidFill>
-                  <a:srgbClr val="A9B7C6"/>
-                </a:solidFill>
-                <a:effectLst/>
-                <a:latin typeface="JetBrains Mono"/>
-              </a:rPr>
-              <a:t>    </a:t>
-            </a:r>
-            <a:r>
-              <a:rPr kumimoji="0" lang="en-US" altLang="en-US" sz="1800" b="0" i="0" u="none" strike="noStrike" cap="none" normalizeH="0" baseline="0">
-                <a:ln>
-                  <a:noFill/>
-                </a:ln>
-                <a:solidFill>
-                  <a:srgbClr val="BBB529"/>
-                </a:solidFill>
-                <a:effectLst/>
-                <a:latin typeface="JetBrains Mono"/>
-              </a:rPr>
-              <a:t>@Override</a:t>
-            </a:r>
-            <a:br>
-              <a:rPr kumimoji="0" lang="en-US" altLang="en-US" sz="1800" b="0" i="0" u="none" strike="noStrike" cap="none" normalizeH="0" baseline="0">
-                <a:ln>
-                  <a:noFill/>
-                </a:ln>
-                <a:solidFill>
-                  <a:srgbClr val="BBB529"/>
-                </a:solidFill>
-                <a:effectLst/>
-                <a:latin typeface="JetBrains Mono"/>
-              </a:rPr>
-            </a:br>
-            <a:r>
-              <a:rPr kumimoji="0" lang="en-US" altLang="en-US" sz="1800" b="0" i="0" u="none" strike="noStrike" cap="none" normalizeH="0" baseline="0">
-                <a:ln>
-                  <a:noFill/>
-                </a:ln>
-                <a:solidFill>
-                  <a:srgbClr val="BBB529"/>
-                </a:solidFill>
-                <a:effectLst/>
-                <a:latin typeface="JetBrains Mono"/>
-              </a:rPr>
-              <a:t>    </a:t>
-            </a:r>
-            <a:r>
-              <a:rPr kumimoji="0" lang="en-US" altLang="en-US" sz="1800" b="0" i="0" u="none" strike="noStrike" cap="none" normalizeH="0" baseline="0">
-                <a:ln>
-                  <a:noFill/>
-                </a:ln>
-                <a:solidFill>
-                  <a:srgbClr val="CC7832"/>
-                </a:solidFill>
-                <a:effectLst/>
-                <a:latin typeface="JetBrains Mono"/>
-              </a:rPr>
-              <a:t>public boolean </a:t>
-            </a:r>
-            <a:r>
-              <a:rPr kumimoji="0" lang="en-US" altLang="en-US" sz="1800" b="0" i="0" u="none" strike="noStrike" cap="none" normalizeH="0" baseline="0">
-                <a:ln>
-                  <a:noFill/>
-                </a:ln>
-                <a:solidFill>
-                  <a:srgbClr val="FFC66D"/>
-                </a:solidFill>
-                <a:effectLst/>
-                <a:latin typeface="JetBrains Mono"/>
-              </a:rPr>
-              <a:t>equals</a:t>
-            </a:r>
-            <a:r>
-              <a:rPr kumimoji="0" lang="en-US" altLang="en-US" sz="1800" b="0" i="0" u="none" strike="noStrike" cap="none" normalizeH="0" baseline="0">
-                <a:ln>
-                  <a:noFill/>
-                </a:ln>
-                <a:solidFill>
-                  <a:srgbClr val="A9B7C6"/>
-                </a:solidFill>
-                <a:effectLst/>
-                <a:latin typeface="JetBrains Mono"/>
-              </a:rPr>
-              <a:t>(Object obj) {</a:t>
-            </a:r>
-            <a:br>
-              <a:rPr kumimoji="0" lang="en-US" altLang="en-US" sz="1800" b="0" i="0" u="none" strike="noStrike" cap="none" normalizeH="0" baseline="0">
-                <a:ln>
-                  <a:noFill/>
-                </a:ln>
-                <a:solidFill>
-                  <a:srgbClr val="A9B7C6"/>
-                </a:solidFill>
-                <a:effectLst/>
-                <a:latin typeface="JetBrains Mono"/>
-              </a:rPr>
-            </a:br>
-            <a:r>
-              <a:rPr kumimoji="0" lang="en-US" altLang="en-US" sz="1800" b="0" i="0" u="none" strike="noStrike" cap="none" normalizeH="0" baseline="0">
-                <a:ln>
-                  <a:noFill/>
-                </a:ln>
-                <a:solidFill>
-                  <a:srgbClr val="A9B7C6"/>
-                </a:solidFill>
-                <a:effectLst/>
-                <a:latin typeface="JetBrains Mono"/>
-              </a:rPr>
-              <a:t>        </a:t>
-            </a:r>
-            <a:r>
-              <a:rPr kumimoji="0" lang="en-US" altLang="en-US" sz="1800" b="0" i="0" u="none" strike="noStrike" cap="none" normalizeH="0" baseline="0">
-                <a:ln>
-                  <a:noFill/>
-                </a:ln>
-                <a:solidFill>
-                  <a:srgbClr val="808080"/>
-                </a:solidFill>
-                <a:effectLst/>
-                <a:latin typeface="JetBrains Mono"/>
-              </a:rPr>
-              <a:t>//needs to be implemented</a:t>
-            </a:r>
-            <a:br>
-              <a:rPr kumimoji="0" lang="en-US" altLang="en-US" sz="1800" b="0" i="0" u="none" strike="noStrike" cap="none" normalizeH="0" baseline="0">
-                <a:ln>
-                  <a:noFill/>
-                </a:ln>
-                <a:solidFill>
-                  <a:srgbClr val="808080"/>
-                </a:solidFill>
-                <a:effectLst/>
-                <a:latin typeface="JetBrains Mono"/>
-              </a:rPr>
-            </a:br>
-            <a:r>
-              <a:rPr kumimoji="0" lang="en-US" altLang="en-US" sz="1800" b="0" i="0" u="none" strike="noStrike" cap="none" normalizeH="0" baseline="0">
-                <a:ln>
-                  <a:noFill/>
-                </a:ln>
-                <a:solidFill>
-                  <a:srgbClr val="808080"/>
-                </a:solidFill>
-                <a:effectLst/>
-                <a:latin typeface="JetBrains Mono"/>
-              </a:rPr>
-              <a:t>    </a:t>
-            </a:r>
-            <a:r>
-              <a:rPr kumimoji="0" lang="en-US" altLang="en-US" sz="1800" b="0" i="0" u="none" strike="noStrike" cap="none" normalizeH="0" baseline="0">
-                <a:ln>
-                  <a:noFill/>
-                </a:ln>
-                <a:solidFill>
-                  <a:srgbClr val="A9B7C6"/>
-                </a:solidFill>
-                <a:effectLst/>
-                <a:latin typeface="JetBrains Mono"/>
-              </a:rPr>
-              <a:t>}</a:t>
-            </a:r>
-            <a:br>
-              <a:rPr kumimoji="0" lang="en-US" altLang="en-US" sz="1800" b="0" i="0" u="none" strike="noStrike" cap="none" normalizeH="0" baseline="0">
-                <a:ln>
-                  <a:noFill/>
-                </a:ln>
-                <a:solidFill>
-                  <a:srgbClr val="A9B7C6"/>
-                </a:solidFill>
-                <a:effectLst/>
-                <a:latin typeface="JetBrains Mono"/>
-              </a:rPr>
-            </a:br>
-            <a:r>
-              <a:rPr kumimoji="0" lang="en-US" altLang="en-US" sz="1800" b="0" i="0" u="none" strike="noStrike" cap="none" normalizeH="0" baseline="0">
-                <a:ln>
-                  <a:noFill/>
-                </a:ln>
-                <a:solidFill>
-                  <a:srgbClr val="A9B7C6"/>
-                </a:solidFill>
-                <a:effectLst/>
-                <a:latin typeface="JetBrains Mono"/>
-              </a:rPr>
-              <a:t>    </a:t>
-            </a:r>
-            <a:r>
-              <a:rPr kumimoji="0" lang="en-US" altLang="en-US" sz="1800" b="0" i="0" u="none" strike="noStrike" cap="none" normalizeH="0" baseline="0">
-                <a:ln>
-                  <a:noFill/>
-                </a:ln>
-                <a:solidFill>
-                  <a:srgbClr val="CC7832"/>
-                </a:solidFill>
-                <a:effectLst/>
-                <a:latin typeface="JetBrains Mono"/>
-              </a:rPr>
-              <a:t>public </a:t>
-            </a:r>
-            <a:r>
-              <a:rPr kumimoji="0" lang="en-US" altLang="en-US" sz="1800" b="0" i="0" u="none" strike="noStrike" cap="none" normalizeH="0" baseline="0">
-                <a:ln>
-                  <a:noFill/>
-                </a:ln>
-                <a:solidFill>
-                  <a:srgbClr val="A9B7C6"/>
-                </a:solidFill>
-                <a:effectLst/>
-                <a:latin typeface="JetBrains Mono"/>
-              </a:rPr>
-              <a:t>String </a:t>
-            </a:r>
-            <a:r>
-              <a:rPr kumimoji="0" lang="en-US" altLang="en-US" sz="1800" b="0" i="0" u="none" strike="noStrike" cap="none" normalizeH="0" baseline="0">
-                <a:ln>
-                  <a:noFill/>
-                </a:ln>
-                <a:solidFill>
-                  <a:srgbClr val="FFC66D"/>
-                </a:solidFill>
-                <a:effectLst/>
-                <a:latin typeface="JetBrains Mono"/>
-              </a:rPr>
-              <a:t>toString</a:t>
-            </a:r>
-            <a:r>
-              <a:rPr kumimoji="0" lang="en-US" altLang="en-US" sz="1800" b="0" i="0" u="none" strike="noStrike" cap="none" normalizeH="0" baseline="0">
-                <a:ln>
-                  <a:noFill/>
-                </a:ln>
-                <a:solidFill>
-                  <a:srgbClr val="A9B7C6"/>
-                </a:solidFill>
-                <a:effectLst/>
-                <a:latin typeface="JetBrains Mono"/>
-              </a:rPr>
-              <a:t>(){</a:t>
-            </a:r>
-            <a:br>
-              <a:rPr kumimoji="0" lang="en-US" altLang="en-US" sz="1800" b="0" i="0" u="none" strike="noStrike" cap="none" normalizeH="0" baseline="0">
-                <a:ln>
-                  <a:noFill/>
-                </a:ln>
-                <a:solidFill>
-                  <a:srgbClr val="A9B7C6"/>
-                </a:solidFill>
-                <a:effectLst/>
-                <a:latin typeface="JetBrains Mono"/>
-              </a:rPr>
-            </a:br>
-            <a:r>
-              <a:rPr kumimoji="0" lang="en-US" altLang="en-US" sz="1800" b="0" i="0" u="none" strike="noStrike" cap="none" normalizeH="0" baseline="0">
-                <a:ln>
-                  <a:noFill/>
-                </a:ln>
-                <a:solidFill>
-                  <a:srgbClr val="A9B7C6"/>
-                </a:solidFill>
-                <a:effectLst/>
-                <a:latin typeface="JetBrains Mono"/>
-              </a:rPr>
-              <a:t>        </a:t>
-            </a:r>
-            <a:r>
-              <a:rPr kumimoji="0" lang="en-US" altLang="en-US" sz="1800" b="0" i="0" u="none" strike="noStrike" cap="none" normalizeH="0" baseline="0">
-                <a:ln>
-                  <a:noFill/>
-                </a:ln>
-                <a:solidFill>
-                  <a:srgbClr val="CC7832"/>
-                </a:solidFill>
-                <a:effectLst/>
-                <a:latin typeface="JetBrains Mono"/>
-              </a:rPr>
-              <a:t>return </a:t>
-            </a:r>
-            <a:r>
-              <a:rPr kumimoji="0" lang="en-US" altLang="en-US" sz="1800" b="0" i="0" u="none" strike="noStrike" cap="none" normalizeH="0" baseline="0">
-                <a:ln>
-                  <a:noFill/>
-                </a:ln>
-                <a:solidFill>
-                  <a:srgbClr val="6A8759"/>
-                </a:solidFill>
-                <a:effectLst/>
-                <a:latin typeface="JetBrains Mono"/>
-              </a:rPr>
-              <a:t>"name: " </a:t>
-            </a:r>
-            <a:r>
-              <a:rPr kumimoji="0" lang="en-US" altLang="en-US" sz="1800" b="0" i="0" u="none" strike="noStrike" cap="none" normalizeH="0" baseline="0">
-                <a:ln>
-                  <a:noFill/>
-                </a:ln>
-                <a:solidFill>
-                  <a:srgbClr val="A9B7C6"/>
-                </a:solidFill>
-                <a:effectLst/>
-                <a:latin typeface="JetBrains Mono"/>
-              </a:rPr>
-              <a:t>+ </a:t>
-            </a:r>
-            <a:r>
-              <a:rPr kumimoji="0" lang="en-US" altLang="en-US" sz="1800" b="0" i="0" u="none" strike="noStrike" cap="none" normalizeH="0" baseline="0">
-                <a:ln>
-                  <a:noFill/>
-                </a:ln>
-                <a:solidFill>
-                  <a:srgbClr val="9876AA"/>
-                </a:solidFill>
-                <a:effectLst/>
-                <a:latin typeface="JetBrains Mono"/>
-              </a:rPr>
-              <a:t>name </a:t>
-            </a:r>
-            <a:r>
-              <a:rPr kumimoji="0" lang="en-US" altLang="en-US" sz="1800" b="0" i="0" u="none" strike="noStrike" cap="none" normalizeH="0" baseline="0">
-                <a:ln>
-                  <a:noFill/>
-                </a:ln>
-                <a:solidFill>
-                  <a:srgbClr val="A9B7C6"/>
-                </a:solidFill>
-                <a:effectLst/>
-                <a:latin typeface="JetBrains Mono"/>
-              </a:rPr>
-              <a:t>+ </a:t>
-            </a:r>
-            <a:r>
-              <a:rPr kumimoji="0" lang="en-US" altLang="en-US" sz="1800" b="0" i="0" u="none" strike="noStrike" cap="none" normalizeH="0" baseline="0">
-                <a:ln>
-                  <a:noFill/>
-                </a:ln>
-                <a:solidFill>
-                  <a:srgbClr val="6A8759"/>
-                </a:solidFill>
-                <a:effectLst/>
-                <a:latin typeface="JetBrains Mono"/>
-              </a:rPr>
-              <a:t>" area: " </a:t>
-            </a:r>
-            <a:r>
-              <a:rPr kumimoji="0" lang="en-US" altLang="en-US" sz="1800" b="0" i="0" u="none" strike="noStrike" cap="none" normalizeH="0" baseline="0">
-                <a:ln>
-                  <a:noFill/>
-                </a:ln>
-                <a:solidFill>
-                  <a:srgbClr val="A9B7C6"/>
-                </a:solidFill>
-                <a:effectLst/>
-                <a:latin typeface="JetBrains Mono"/>
-              </a:rPr>
-              <a:t>+ </a:t>
-            </a:r>
-            <a:r>
-              <a:rPr kumimoji="0" lang="en-US" altLang="en-US" sz="1800" b="0" i="0" u="none" strike="noStrike" cap="none" normalizeH="0" baseline="0">
-                <a:ln>
-                  <a:noFill/>
-                </a:ln>
-                <a:solidFill>
-                  <a:srgbClr val="9876AA"/>
-                </a:solidFill>
-                <a:effectLst/>
-                <a:latin typeface="JetBrains Mono"/>
-              </a:rPr>
-              <a:t>area</a:t>
-            </a:r>
-            <a:r>
-              <a:rPr kumimoji="0" lang="en-US" altLang="en-US" sz="1800" b="0" i="0" u="none" strike="noStrike" cap="none" normalizeH="0" baseline="0">
-                <a:ln>
-                  <a:noFill/>
-                </a:ln>
-                <a:solidFill>
-                  <a:srgbClr val="CC7832"/>
-                </a:solidFill>
-                <a:effectLst/>
-                <a:latin typeface="JetBrains Mono"/>
-              </a:rPr>
-              <a:t>;</a:t>
-            </a:r>
-            <a:br>
-              <a:rPr kumimoji="0" lang="en-US" altLang="en-US" sz="1800" b="0" i="0" u="none" strike="noStrike" cap="none" normalizeH="0" baseline="0">
-                <a:ln>
-                  <a:noFill/>
-                </a:ln>
-                <a:solidFill>
-                  <a:srgbClr val="CC7832"/>
-                </a:solidFill>
-                <a:effectLst/>
-                <a:latin typeface="JetBrains Mono"/>
-              </a:rPr>
-            </a:br>
-            <a:r>
-              <a:rPr kumimoji="0" lang="en-US" altLang="en-US" sz="1800" b="0" i="0" u="none" strike="noStrike" cap="none" normalizeH="0" baseline="0">
-                <a:ln>
-                  <a:noFill/>
-                </a:ln>
-                <a:solidFill>
-                  <a:srgbClr val="CC7832"/>
-                </a:solidFill>
-                <a:effectLst/>
-                <a:latin typeface="JetBrains Mono"/>
-              </a:rPr>
-              <a:t>    </a:t>
-            </a:r>
-            <a:r>
-              <a:rPr kumimoji="0" lang="en-US" altLang="en-US" sz="1800" b="0" i="0" u="none" strike="noStrike" cap="none" normalizeH="0" baseline="0">
-                <a:ln>
-                  <a:noFill/>
-                </a:ln>
-                <a:solidFill>
-                  <a:srgbClr val="A9B7C6"/>
-                </a:solidFill>
-                <a:effectLst/>
-                <a:latin typeface="JetBrains Mono"/>
-              </a:rPr>
-              <a:t>}</a:t>
-            </a:r>
-            <a:br>
-              <a:rPr kumimoji="0" lang="en-US" altLang="en-US" sz="1800" b="0" i="0" u="none" strike="noStrike" cap="none" normalizeH="0" baseline="0">
-                <a:ln>
-                  <a:noFill/>
-                </a:ln>
-                <a:solidFill>
-                  <a:srgbClr val="A9B7C6"/>
-                </a:solidFill>
-                <a:effectLst/>
-                <a:latin typeface="JetBrains Mono"/>
-              </a:rPr>
-            </a:br>
-            <a:r>
-              <a:rPr kumimoji="0" lang="en-US" altLang="en-US" sz="1800" b="0" i="0" u="none" strike="noStrike" cap="none" normalizeH="0" baseline="0">
-                <a:ln>
-                  <a:noFill/>
-                </a:ln>
-                <a:solidFill>
-                  <a:srgbClr val="A9B7C6"/>
-                </a:solidFill>
-                <a:effectLst/>
-                <a:latin typeface="JetBrains Mono"/>
-              </a:rPr>
-              <a:t>}</a:t>
-            </a:r>
-            <a:endParaRPr kumimoji="0" lang="en-US" altLang="en-US" sz="1800" b="0" i="0" u="none" strike="noStrike" cap="none" normalizeH="0" baseline="0">
-              <a:ln>
-                <a:noFill/>
-              </a:ln>
-              <a:solidFill>
-                <a:schemeClr val="tx1"/>
-              </a:solidFill>
-              <a:effectLst/>
-              <a:latin typeface="Arial" panose="020B0604020202020204" pitchFamily="34" charset="0"/>
-            </a:endParaRPr>
-          </a:p>
-        </p:txBody>
-      </p:sp>
-    </p:spTree>
-    <p:extLst>
-      <p:ext uri="{BB962C8B-B14F-4D97-AF65-F5344CB8AC3E}">
-        <p14:creationId xmlns:p14="http://schemas.microsoft.com/office/powerpoint/2010/main" val="1035711711"/>
       </p:ext>
     </p:extLst>
   </p:cSld>

</xml_diff>